<commit_message>
Refine the presentation file
</commit_message>
<xml_diff>
--- a/cdc_git_ws3.pptx
+++ b/cdc_git_ws3.pptx
@@ -5,7 +5,7 @@
     <p:sldMasterId id="2147483648" r:id="rId4"/>
   </p:sldMasterIdLst>
   <p:notesMasterIdLst>
-    <p:notesMasterId r:id="rId16"/>
+    <p:notesMasterId r:id="rId17"/>
   </p:notesMasterIdLst>
   <p:sldIdLst>
     <p:sldId id="256" r:id="rId5"/>
@@ -17,8 +17,9 @@
     <p:sldId id="311" r:id="rId11"/>
     <p:sldId id="313" r:id="rId12"/>
     <p:sldId id="315" r:id="rId13"/>
-    <p:sldId id="317" r:id="rId14"/>
-    <p:sldId id="309" r:id="rId15"/>
+    <p:sldId id="318" r:id="rId14"/>
+    <p:sldId id="317" r:id="rId15"/>
+    <p:sldId id="309" r:id="rId16"/>
   </p:sldIdLst>
   <p:sldSz cx="6858000" cy="5143500"/>
   <p:notesSz cx="6858000" cy="9144000"/>
@@ -633,6 +634,176 @@
           <a:bodyPr/>
           <a:lstStyle/>
           <a:p>
+            <a:r>
+              <a:rPr lang="en-US" dirty="0" smtClean="0"/>
+              <a:t>Conflict may happened</a:t>
+            </a:r>
+            <a:r>
+              <a:rPr lang="en-US" baseline="0" dirty="0" smtClean="0"/>
+              <a:t> here. Github will notify branch has conflicts that must be resolved.</a:t>
+            </a:r>
+          </a:p>
+          <a:p>
+            <a:r>
+              <a:rPr lang="en-US" baseline="0" dirty="0" smtClean="0"/>
+              <a:t>There are 2 options: </a:t>
+            </a:r>
+          </a:p>
+          <a:p>
+            <a:pPr marL="228600" indent="-228600">
+              <a:buAutoNum type="arabicPeriod"/>
+            </a:pPr>
+            <a:r>
+              <a:rPr lang="en-US" b="1" baseline="0" dirty="0" smtClean="0"/>
+              <a:t>The project owner solve it manually</a:t>
+            </a:r>
+          </a:p>
+          <a:p>
+            <a:pPr marL="0" indent="0">
+              <a:buNone/>
+            </a:pPr>
+            <a:endParaRPr lang="en-US" baseline="0" dirty="0" smtClean="0"/>
+          </a:p>
+          <a:p>
+            <a:r>
+              <a:rPr lang="en-US" b="1" dirty="0" smtClean="0"/>
+              <a:t>Step 1:</a:t>
+            </a:r>
+            <a:r>
+              <a:rPr lang="en-US" dirty="0" smtClean="0"/>
+              <a:t> From your project repository, check out a new branch and test the changes.</a:t>
+            </a:r>
+          </a:p>
+          <a:p>
+            <a:r>
+              <a:rPr lang="en-US" dirty="0" smtClean="0"/>
+              <a:t>$ </a:t>
+            </a:r>
+            <a:r>
+              <a:rPr lang="en-US" dirty="0" err="1" smtClean="0"/>
+              <a:t>git</a:t>
+            </a:r>
+            <a:r>
+              <a:rPr lang="en-US" dirty="0" smtClean="0"/>
+              <a:t> checkout -b </a:t>
+            </a:r>
+            <a:r>
+              <a:rPr lang="en-US" dirty="0" err="1" smtClean="0"/>
+              <a:t>suhendra</a:t>
+            </a:r>
+            <a:r>
+              <a:rPr lang="en-US" dirty="0" smtClean="0"/>
+              <a:t>-ep-</a:t>
+            </a:r>
+            <a:r>
+              <a:rPr lang="en-US" dirty="0" err="1" smtClean="0"/>
+              <a:t>feature_branch</a:t>
+            </a:r>
+            <a:r>
+              <a:rPr lang="en-US" dirty="0" smtClean="0"/>
+              <a:t> develop </a:t>
+            </a:r>
+          </a:p>
+          <a:p>
+            <a:r>
+              <a:rPr lang="en-US" dirty="0" smtClean="0"/>
+              <a:t>$ </a:t>
+            </a:r>
+            <a:r>
+              <a:rPr lang="en-US" dirty="0" err="1" smtClean="0"/>
+              <a:t>git</a:t>
+            </a:r>
+            <a:r>
+              <a:rPr lang="en-US" dirty="0" smtClean="0"/>
+              <a:t> pull https://github.com/suhendra-ep/ws3.git </a:t>
+            </a:r>
+            <a:r>
+              <a:rPr lang="en-US" dirty="0" err="1" smtClean="0"/>
+              <a:t>feature_branch</a:t>
+            </a:r>
+            <a:r>
+              <a:rPr lang="en-US" dirty="0" smtClean="0"/>
+              <a:t> </a:t>
+            </a:r>
+          </a:p>
+          <a:p>
+            <a:r>
+              <a:rPr lang="en-US" b="1" dirty="0" smtClean="0"/>
+              <a:t>Step 2:</a:t>
+            </a:r>
+            <a:r>
+              <a:rPr lang="en-US" dirty="0" smtClean="0"/>
+              <a:t> Merge the changes and update on GitHub.</a:t>
+            </a:r>
+          </a:p>
+          <a:p>
+            <a:r>
+              <a:rPr lang="en-US" dirty="0" smtClean="0"/>
+              <a:t>$ </a:t>
+            </a:r>
+            <a:r>
+              <a:rPr lang="en-US" dirty="0" err="1" smtClean="0"/>
+              <a:t>git</a:t>
+            </a:r>
+            <a:r>
+              <a:rPr lang="en-US" dirty="0" smtClean="0"/>
+              <a:t> checkout develop</a:t>
+            </a:r>
+          </a:p>
+          <a:p>
+            <a:r>
+              <a:rPr lang="en-US" dirty="0" smtClean="0"/>
+              <a:t>$ </a:t>
+            </a:r>
+            <a:r>
+              <a:rPr lang="en-US" dirty="0" err="1" smtClean="0"/>
+              <a:t>git</a:t>
+            </a:r>
+            <a:r>
+              <a:rPr lang="en-US" dirty="0" smtClean="0"/>
+              <a:t> merge --no-</a:t>
+            </a:r>
+            <a:r>
+              <a:rPr lang="en-US" dirty="0" err="1" smtClean="0"/>
+              <a:t>ff</a:t>
+            </a:r>
+            <a:r>
+              <a:rPr lang="en-US" dirty="0" smtClean="0"/>
+              <a:t> </a:t>
+            </a:r>
+            <a:r>
+              <a:rPr lang="en-US" dirty="0" err="1" smtClean="0"/>
+              <a:t>suhendra</a:t>
+            </a:r>
+            <a:r>
+              <a:rPr lang="en-US" dirty="0" smtClean="0"/>
+              <a:t>-ep-</a:t>
+            </a:r>
+            <a:r>
+              <a:rPr lang="en-US" dirty="0" err="1" smtClean="0"/>
+              <a:t>feature_branch</a:t>
+            </a:r>
+            <a:endParaRPr lang="en-US" dirty="0" smtClean="0"/>
+          </a:p>
+          <a:p>
+            <a:r>
+              <a:rPr lang="en-US" dirty="0" smtClean="0"/>
+              <a:t>$</a:t>
+            </a:r>
+            <a:r>
+              <a:rPr lang="en-US" baseline="0" dirty="0" smtClean="0"/>
+              <a:t> </a:t>
+            </a:r>
+            <a:r>
+              <a:rPr lang="en-US" dirty="0" err="1" smtClean="0"/>
+              <a:t>git</a:t>
+            </a:r>
+            <a:r>
+              <a:rPr lang="en-US" dirty="0" smtClean="0"/>
+              <a:t> push origin develop</a:t>
+            </a:r>
+          </a:p>
+          <a:p>
             <a:endParaRPr lang="en-US" dirty="0"/>
           </a:p>
         </p:txBody>
@@ -663,7 +834,7 @@
     </p:spTree>
     <p:extLst>
       <p:ext uri="{BB962C8B-B14F-4D97-AF65-F5344CB8AC3E}">
-        <p14:creationId xmlns:p14="http://schemas.microsoft.com/office/powerpoint/2010/main" val="1973261343"/>
+        <p14:creationId xmlns:p14="http://schemas.microsoft.com/office/powerpoint/2010/main" val="4256636808"/>
       </p:ext>
     </p:extLst>
   </p:cSld>
@@ -717,7 +888,7 @@
           <a:bodyPr/>
           <a:lstStyle/>
           <a:p>
-            <a:endParaRPr lang="en-US" dirty="0"/>
+            <a:endParaRPr lang="en-US" baseline="0" dirty="0" smtClean="0"/>
           </a:p>
         </p:txBody>
       </p:sp>
@@ -739,6 +910,90 @@
             <a:fld id="{7959948B-77FA-4B75-B65F-C5051F11C89F}" type="slidenum">
               <a:rPr lang="en-US" smtClean="0"/>
               <a:t>11</a:t>
+            </a:fld>
+            <a:endParaRPr lang="en-US"/>
+          </a:p>
+        </p:txBody>
+      </p:sp>
+    </p:spTree>
+    <p:extLst>
+      <p:ext uri="{BB962C8B-B14F-4D97-AF65-F5344CB8AC3E}">
+        <p14:creationId xmlns:p14="http://schemas.microsoft.com/office/powerpoint/2010/main" val="1973261343"/>
+      </p:ext>
+    </p:extLst>
+  </p:cSld>
+  <p:clrMapOvr>
+    <a:masterClrMapping/>
+  </p:clrMapOvr>
+</p:notes>
+</file>
+
+<file path=ppt/notesSlides/notesSlide12.xml><?xml version="1.0" encoding="utf-8"?>
+<p:notes xmlns:a="http://schemas.openxmlformats.org/drawingml/2006/main" xmlns:r="http://schemas.openxmlformats.org/officeDocument/2006/relationships" xmlns:p="http://schemas.openxmlformats.org/presentationml/2006/main">
+  <p:cSld>
+    <p:spTree>
+      <p:nvGrpSpPr>
+        <p:cNvPr id="1" name=""/>
+        <p:cNvGrpSpPr/>
+        <p:nvPr/>
+      </p:nvGrpSpPr>
+      <p:grpSpPr>
+        <a:xfrm>
+          <a:off x="0" y="0"/>
+          <a:ext cx="0" cy="0"/>
+          <a:chOff x="0" y="0"/>
+          <a:chExt cx="0" cy="0"/>
+        </a:xfrm>
+      </p:grpSpPr>
+      <p:sp>
+        <p:nvSpPr>
+          <p:cNvPr id="2" name="Slide Image Placeholder 1"/>
+          <p:cNvSpPr>
+            <a:spLocks noGrp="1" noRot="1" noChangeAspect="1"/>
+          </p:cNvSpPr>
+          <p:nvPr>
+            <p:ph type="sldImg"/>
+          </p:nvPr>
+        </p:nvSpPr>
+        <p:spPr/>
+      </p:sp>
+      <p:sp>
+        <p:nvSpPr>
+          <p:cNvPr id="3" name="Notes Placeholder 2"/>
+          <p:cNvSpPr>
+            <a:spLocks noGrp="1"/>
+          </p:cNvSpPr>
+          <p:nvPr>
+            <p:ph type="body" idx="1"/>
+          </p:nvPr>
+        </p:nvSpPr>
+        <p:spPr/>
+        <p:txBody>
+          <a:bodyPr/>
+          <a:lstStyle/>
+          <a:p>
+            <a:endParaRPr lang="en-US" dirty="0"/>
+          </a:p>
+        </p:txBody>
+      </p:sp>
+      <p:sp>
+        <p:nvSpPr>
+          <p:cNvPr id="4" name="Slide Number Placeholder 3"/>
+          <p:cNvSpPr>
+            <a:spLocks noGrp="1"/>
+          </p:cNvSpPr>
+          <p:nvPr>
+            <p:ph type="sldNum" sz="quarter" idx="10"/>
+          </p:nvPr>
+        </p:nvSpPr>
+        <p:spPr/>
+        <p:txBody>
+          <a:bodyPr/>
+          <a:lstStyle/>
+          <a:p>
+            <a:fld id="{7959948B-77FA-4B75-B65F-C5051F11C89F}" type="slidenum">
+              <a:rPr lang="en-US" smtClean="0"/>
+              <a:t>12</a:t>
             </a:fld>
             <a:endParaRPr lang="en-US"/>
           </a:p>
@@ -1438,13 +1693,46 @@
           <a:lstStyle/>
           <a:p>
             <a:r>
-              <a:rPr lang="en-ID" dirty="0" smtClean="0"/>
-              <a:t>We replay</a:t>
-            </a:r>
-            <a:r>
-              <a:rPr lang="en-ID" baseline="0" dirty="0" smtClean="0"/>
-              <a:t> the commands with the &lt;base&gt; we picked</a:t>
-            </a:r>
+              <a:rPr lang="en-US" dirty="0" smtClean="0"/>
+              <a:t>Review</a:t>
+            </a:r>
+            <a:r>
+              <a:rPr lang="en-US" baseline="0" dirty="0" smtClean="0"/>
+              <a:t> Process: </a:t>
+            </a:r>
+            <a:br>
+              <a:rPr lang="en-US" baseline="0" dirty="0" smtClean="0"/>
+            </a:br>
+            <a:r>
+              <a:rPr lang="en-US" b="1" dirty="0" smtClean="0"/>
+              <a:t>Commen</a:t>
+            </a:r>
+            <a:r>
+              <a:rPr lang="en-US" dirty="0" smtClean="0"/>
+              <a:t>t Submit general feedback without explicit approval.</a:t>
+            </a:r>
+          </a:p>
+          <a:p>
+            <a:r>
+              <a:rPr lang="en-US" b="1" dirty="0" smtClean="0"/>
+              <a:t>Approve</a:t>
+            </a:r>
+            <a:r>
+              <a:rPr lang="en-US" dirty="0" smtClean="0"/>
+              <a:t> Submit feedback and approve merging these changes.</a:t>
+            </a:r>
+          </a:p>
+          <a:p>
+            <a:r>
+              <a:rPr lang="en-US" b="1" dirty="0" smtClean="0"/>
+              <a:t>Request</a:t>
+            </a:r>
+            <a:r>
+              <a:rPr lang="en-US" dirty="0" smtClean="0"/>
+              <a:t> changes Submit feedback that must be addressed before merging.</a:t>
+            </a:r>
+          </a:p>
+          <a:p>
             <a:endParaRPr lang="en-US" dirty="0"/>
           </a:p>
         </p:txBody>
@@ -3707,7 +3995,7 @@
         </p:nvSpPr>
         <p:spPr>
           <a:xfrm>
-            <a:off x="332656" y="195486"/>
+            <a:off x="260648" y="51470"/>
             <a:ext cx="6192688" cy="369332"/>
           </a:xfrm>
           <a:prstGeom prst="rect">
@@ -3728,7 +4016,7 @@
                 </a:solidFill>
                 <a:latin typeface="Bookman Old Style" panose="02050604050505020204" pitchFamily="18" charset="0"/>
               </a:rPr>
-              <a:t>CDC – git fork &amp; pull request </a:t>
+              <a:t>CDC – git fork &amp; pull </a:t>
             </a:r>
             <a:r>
               <a:rPr lang="en-ID" b="1" dirty="0" smtClean="0">
@@ -3737,7 +4025,7 @@
                 </a:solidFill>
                 <a:latin typeface="Bookman Old Style" panose="02050604050505020204" pitchFamily="18" charset="0"/>
               </a:rPr>
-              <a:t>/ Close pull request</a:t>
+              <a:t>request/Review the changes</a:t>
             </a:r>
             <a:endParaRPr lang="en-US" b="1" dirty="0">
               <a:solidFill>
@@ -3750,14 +4038,14 @@
       </p:sp>
       <p:sp>
         <p:nvSpPr>
-          <p:cNvPr id="7" name="TextBox 6"/>
+          <p:cNvPr id="13" name="TextBox 12"/>
           <p:cNvSpPr txBox="1"/>
           <p:nvPr/>
         </p:nvSpPr>
         <p:spPr>
           <a:xfrm>
-            <a:off x="332656" y="555526"/>
-            <a:ext cx="4392488" cy="307777"/>
+            <a:off x="3501008" y="464354"/>
+            <a:ext cx="2924944" cy="523220"/>
           </a:xfrm>
           <a:prstGeom prst="rect">
             <a:avLst/>
@@ -3776,11 +4064,11 @@
             </a:pPr>
             <a:r>
               <a:rPr lang="en-US" sz="1400" dirty="0" smtClean="0"/>
-              <a:t>Project owner happy, </a:t>
+              <a:t>Project owner </a:t>
             </a:r>
             <a:r>
               <a:rPr lang="en-US" sz="1400" dirty="0" smtClean="0"/>
-              <a:t>merge pull request and close!</a:t>
+              <a:t>and contributor may have discussion here.</a:t>
             </a:r>
             <a:endParaRPr lang="en-US" sz="1400" dirty="0"/>
           </a:p>
@@ -3802,48 +4090,24 @@
         </p:blipFill>
         <p:spPr>
           <a:xfrm>
-            <a:off x="663707" y="843558"/>
-            <a:ext cx="4249659" cy="1069667"/>
+            <a:off x="404664" y="411510"/>
+            <a:ext cx="2952328" cy="1944216"/>
           </a:xfrm>
           <a:prstGeom prst="rect">
             <a:avLst/>
           </a:prstGeom>
         </p:spPr>
       </p:pic>
-      <p:pic>
-        <p:nvPicPr>
-          <p:cNvPr id="2" name="Picture 1"/>
-          <p:cNvPicPr>
-            <a:picLocks noChangeAspect="1"/>
-          </p:cNvPicPr>
-          <p:nvPr/>
-        </p:nvPicPr>
-        <p:blipFill>
-          <a:blip r:embed="rId4"/>
-          <a:stretch>
-            <a:fillRect/>
-          </a:stretch>
-        </p:blipFill>
-        <p:spPr>
-          <a:xfrm>
-            <a:off x="691509" y="1995686"/>
-            <a:ext cx="4249659" cy="1325203"/>
-          </a:xfrm>
-          <a:prstGeom prst="rect">
-            <a:avLst/>
-          </a:prstGeom>
-        </p:spPr>
-      </p:pic>
-      <p:sp>
-        <p:nvSpPr>
-          <p:cNvPr id="9" name="TextBox 8"/>
+      <p:sp>
+        <p:nvSpPr>
+          <p:cNvPr id="8" name="TextBox 7"/>
           <p:cNvSpPr txBox="1"/>
           <p:nvPr/>
         </p:nvSpPr>
         <p:spPr>
           <a:xfrm>
-            <a:off x="332656" y="3507854"/>
-            <a:ext cx="4392488" cy="307777"/>
+            <a:off x="265956" y="2407989"/>
+            <a:ext cx="3595092" cy="307777"/>
           </a:xfrm>
           <a:prstGeom prst="rect">
             <a:avLst/>
@@ -3856,36 +4120,173 @@
           </a:bodyPr>
           <a:lstStyle/>
           <a:p>
+            <a:r>
+              <a:rPr lang="en-US" sz="1400" b="1" dirty="0" smtClean="0"/>
+              <a:t>Wait!!</a:t>
+            </a:r>
+            <a:r>
+              <a:rPr lang="en-US" sz="1400" dirty="0" smtClean="0"/>
+              <a:t> </a:t>
+            </a:r>
+            <a:r>
+              <a:rPr lang="en-US" sz="1400" b="1" dirty="0" smtClean="0"/>
+              <a:t>Project owner found merge conflict</a:t>
+            </a:r>
+            <a:r>
+              <a:rPr lang="en-US" sz="1400" dirty="0" smtClean="0"/>
+              <a:t>.</a:t>
+            </a:r>
+          </a:p>
+        </p:txBody>
+      </p:sp>
+      <p:sp>
+        <p:nvSpPr>
+          <p:cNvPr id="15" name="TextBox 14"/>
+          <p:cNvSpPr txBox="1"/>
+          <p:nvPr/>
+        </p:nvSpPr>
+        <p:spPr>
+          <a:xfrm>
+            <a:off x="404664" y="2643758"/>
+            <a:ext cx="5832648" cy="292388"/>
+          </a:xfrm>
+          <a:prstGeom prst="rect">
+            <a:avLst/>
+          </a:prstGeom>
+          <a:noFill/>
+        </p:spPr>
+        <p:txBody>
+          <a:bodyPr wrap="square" rtlCol="0">
+            <a:spAutoFit/>
+          </a:bodyPr>
+          <a:lstStyle/>
+          <a:p>
             <a:pPr marL="285750" indent="-285750">
               <a:buFont typeface="Wingdings" panose="05000000000000000000" pitchFamily="2" charset="2"/>
-              <a:buChar char="Ø"/>
+              <a:buChar char="v"/>
             </a:pPr>
             <a:r>
-              <a:rPr lang="en-US" sz="1400" dirty="0" smtClean="0"/>
-              <a:t>Contributor </a:t>
-            </a:r>
-            <a:r>
-              <a:rPr lang="en-US" sz="1400" dirty="0"/>
-              <a:t>may sync  </a:t>
-            </a:r>
-            <a:r>
-              <a:rPr lang="en-US" sz="1400" dirty="0" smtClean="0"/>
-              <a:t>the forked repository</a:t>
-            </a:r>
-            <a:endParaRPr lang="en-US" sz="1400" dirty="0"/>
-          </a:p>
-        </p:txBody>
-      </p:sp>
-      <p:sp>
-        <p:nvSpPr>
-          <p:cNvPr id="10" name="TextBox 9"/>
+              <a:rPr lang="en-US" sz="1300" dirty="0"/>
+              <a:t>I don’t </a:t>
+            </a:r>
+            <a:r>
+              <a:rPr lang="en-US" sz="1300" dirty="0" err="1"/>
+              <a:t>wanna</a:t>
+            </a:r>
+            <a:r>
+              <a:rPr lang="en-US" sz="1300" dirty="0"/>
+              <a:t> do it, go back revise it</a:t>
+            </a:r>
+            <a:r>
+              <a:rPr lang="en-US" sz="1300" dirty="0" smtClean="0"/>
+              <a:t>!</a:t>
+            </a:r>
+            <a:endParaRPr lang="en-US" sz="1300" dirty="0"/>
+          </a:p>
+        </p:txBody>
+      </p:sp>
+      <p:sp>
+        <p:nvSpPr>
+          <p:cNvPr id="16" name="TextBox 15"/>
           <p:cNvSpPr txBox="1"/>
           <p:nvPr/>
         </p:nvSpPr>
         <p:spPr>
           <a:xfrm>
-            <a:off x="476672" y="3867894"/>
-            <a:ext cx="5544616" cy="276999"/>
+            <a:off x="417637" y="2859782"/>
+            <a:ext cx="5832648" cy="307777"/>
+          </a:xfrm>
+          <a:prstGeom prst="rect">
+            <a:avLst/>
+          </a:prstGeom>
+          <a:noFill/>
+        </p:spPr>
+        <p:txBody>
+          <a:bodyPr wrap="square" rtlCol="0">
+            <a:spAutoFit/>
+          </a:bodyPr>
+          <a:lstStyle/>
+          <a:p>
+            <a:pPr marL="285750" indent="-285750">
+              <a:buFont typeface="Wingdings" panose="05000000000000000000" pitchFamily="2" charset="2"/>
+              <a:buChar char="v"/>
+            </a:pPr>
+            <a:r>
+              <a:rPr lang="en-US" sz="1300" dirty="0" smtClean="0"/>
+              <a:t>OK. I will do it by myself. Here what I </a:t>
+            </a:r>
+            <a:r>
+              <a:rPr lang="en-US" sz="1300" dirty="0" err="1" smtClean="0"/>
+              <a:t>wanna</a:t>
+            </a:r>
+            <a:r>
+              <a:rPr lang="en-US" sz="1300" dirty="0" smtClean="0"/>
+              <a:t> do</a:t>
+            </a:r>
+            <a:r>
+              <a:rPr lang="en-US" sz="1400" dirty="0" smtClean="0"/>
+              <a:t>:</a:t>
+            </a:r>
+            <a:endParaRPr lang="en-US" sz="1400" dirty="0"/>
+          </a:p>
+        </p:txBody>
+      </p:sp>
+      <p:sp>
+        <p:nvSpPr>
+          <p:cNvPr id="17" name="TextBox 16"/>
+          <p:cNvSpPr txBox="1"/>
+          <p:nvPr/>
+        </p:nvSpPr>
+        <p:spPr>
+          <a:xfrm>
+            <a:off x="692696" y="3075806"/>
+            <a:ext cx="5832648" cy="261610"/>
+          </a:xfrm>
+          <a:prstGeom prst="rect">
+            <a:avLst/>
+          </a:prstGeom>
+          <a:noFill/>
+        </p:spPr>
+        <p:txBody>
+          <a:bodyPr wrap="square" rtlCol="0">
+            <a:spAutoFit/>
+          </a:bodyPr>
+          <a:lstStyle/>
+          <a:p>
+            <a:r>
+              <a:rPr lang="en-US" sz="1100" b="1" dirty="0"/>
+              <a:t>Step 1:</a:t>
+            </a:r>
+            <a:r>
+              <a:rPr lang="en-US" sz="1100" dirty="0"/>
+              <a:t> From </a:t>
+            </a:r>
+            <a:r>
+              <a:rPr lang="en-US" sz="1100" dirty="0" smtClean="0"/>
+              <a:t>my project </a:t>
+            </a:r>
+            <a:r>
+              <a:rPr lang="en-US" sz="1100" dirty="0"/>
+              <a:t>repository, check out a new branch and test the changes</a:t>
+            </a:r>
+            <a:r>
+              <a:rPr lang="en-US" sz="1100" dirty="0" smtClean="0"/>
+              <a:t>.</a:t>
+            </a:r>
+            <a:endParaRPr lang="en-US" sz="1100" dirty="0"/>
+          </a:p>
+        </p:txBody>
+      </p:sp>
+      <p:sp>
+        <p:nvSpPr>
+          <p:cNvPr id="19" name="TextBox 18"/>
+          <p:cNvSpPr txBox="1"/>
+          <p:nvPr/>
+        </p:nvSpPr>
+        <p:spPr>
+          <a:xfrm>
+            <a:off x="764703" y="3323768"/>
+            <a:ext cx="5485581" cy="400110"/>
           </a:xfrm>
           <a:prstGeom prst="rect">
             <a:avLst/>
@@ -3912,25 +4313,233 @@
           <a:lstStyle/>
           <a:p>
             <a:r>
-              <a:rPr lang="en-US" sz="1200" dirty="0"/>
+              <a:rPr lang="en-US" sz="1000" dirty="0"/>
               <a:t>$ </a:t>
             </a:r>
             <a:r>
-              <a:rPr lang="en-US" sz="1200" dirty="0" err="1"/>
+              <a:rPr lang="en-US" sz="1000" dirty="0" err="1" smtClean="0"/>
               <a:t>git</a:t>
             </a:r>
             <a:r>
-              <a:rPr lang="en-US" sz="1200" dirty="0"/>
-              <a:t> pull upstream develop</a:t>
-            </a:r>
-            <a:endParaRPr lang="en-US" sz="1200" dirty="0"/>
+              <a:rPr lang="en-US" sz="1000" dirty="0" smtClean="0"/>
+              <a:t> </a:t>
+            </a:r>
+            <a:r>
+              <a:rPr lang="en-US" sz="1000" dirty="0"/>
+              <a:t>checkout -b </a:t>
+            </a:r>
+            <a:r>
+              <a:rPr lang="en-US" sz="1000" dirty="0" err="1"/>
+              <a:t>suhendra</a:t>
+            </a:r>
+            <a:r>
+              <a:rPr lang="en-US" sz="1000" dirty="0"/>
+              <a:t>-ep-</a:t>
+            </a:r>
+            <a:r>
+              <a:rPr lang="en-US" sz="1000" dirty="0" err="1"/>
+              <a:t>feature_branch</a:t>
+            </a:r>
+            <a:r>
+              <a:rPr lang="en-US" sz="1000" dirty="0"/>
+              <a:t> develop </a:t>
+            </a:r>
+            <a:endParaRPr lang="en-US" sz="1000" dirty="0" smtClean="0"/>
+          </a:p>
+          <a:p>
+            <a:r>
+              <a:rPr lang="en-US" sz="1000" dirty="0" smtClean="0"/>
+              <a:t>$ </a:t>
+            </a:r>
+            <a:r>
+              <a:rPr lang="en-US" sz="1000" dirty="0" err="1" smtClean="0"/>
+              <a:t>git</a:t>
+            </a:r>
+            <a:r>
+              <a:rPr lang="en-US" sz="1000" dirty="0" smtClean="0"/>
+              <a:t> </a:t>
+            </a:r>
+            <a:r>
+              <a:rPr lang="en-US" sz="1000" dirty="0"/>
+              <a:t>pull https://github.com/suhendra-ep/ws3.git </a:t>
+            </a:r>
+            <a:r>
+              <a:rPr lang="en-US" sz="1000" dirty="0" err="1"/>
+              <a:t>feature_branch</a:t>
+            </a:r>
+            <a:r>
+              <a:rPr lang="en-US" sz="1000" dirty="0"/>
+              <a:t> </a:t>
+            </a:r>
+          </a:p>
+        </p:txBody>
+      </p:sp>
+      <p:sp>
+        <p:nvSpPr>
+          <p:cNvPr id="20" name="TextBox 19"/>
+          <p:cNvSpPr txBox="1"/>
+          <p:nvPr/>
+        </p:nvSpPr>
+        <p:spPr>
+          <a:xfrm>
+            <a:off x="692696" y="3822308"/>
+            <a:ext cx="5832648" cy="261610"/>
+          </a:xfrm>
+          <a:prstGeom prst="rect">
+            <a:avLst/>
+          </a:prstGeom>
+          <a:noFill/>
+        </p:spPr>
+        <p:txBody>
+          <a:bodyPr wrap="square" rtlCol="0">
+            <a:spAutoFit/>
+          </a:bodyPr>
+          <a:lstStyle/>
+          <a:p>
+            <a:r>
+              <a:rPr lang="en-US" sz="1100" b="1" dirty="0" smtClean="0"/>
+              <a:t>Step </a:t>
+            </a:r>
+            <a:r>
+              <a:rPr lang="en-US" sz="1100" b="1" dirty="0"/>
+              <a:t>2:</a:t>
+            </a:r>
+            <a:r>
+              <a:rPr lang="en-US" sz="1100" dirty="0"/>
+              <a:t> Merge the changes and update on GitHub</a:t>
+            </a:r>
+            <a:r>
+              <a:rPr lang="en-US" sz="1100" dirty="0" smtClean="0"/>
+              <a:t>.</a:t>
+            </a:r>
+            <a:endParaRPr lang="en-US" sz="1100" dirty="0"/>
+          </a:p>
+        </p:txBody>
+      </p:sp>
+      <p:sp>
+        <p:nvSpPr>
+          <p:cNvPr id="21" name="TextBox 20"/>
+          <p:cNvSpPr txBox="1"/>
+          <p:nvPr/>
+        </p:nvSpPr>
+        <p:spPr>
+          <a:xfrm>
+            <a:off x="764704" y="4083918"/>
+            <a:ext cx="5485580" cy="553998"/>
+          </a:xfrm>
+          <a:prstGeom prst="rect">
+            <a:avLst/>
+          </a:prstGeom>
+        </p:spPr>
+        <p:style>
+          <a:lnRef idx="0">
+            <a:schemeClr val="dk1"/>
+          </a:lnRef>
+          <a:fillRef idx="3">
+            <a:schemeClr val="dk1"/>
+          </a:fillRef>
+          <a:effectRef idx="3">
+            <a:schemeClr val="dk1"/>
+          </a:effectRef>
+          <a:fontRef idx="minor">
+            <a:schemeClr val="lt1"/>
+          </a:fontRef>
+        </p:style>
+        <p:txBody>
+          <a:bodyPr wrap="square" rtlCol="0">
+            <a:spAutoFit/>
+          </a:bodyPr>
+          <a:lstStyle/>
+          <a:p>
+            <a:r>
+              <a:rPr lang="en-US" sz="1000" dirty="0"/>
+              <a:t>$ </a:t>
+            </a:r>
+            <a:r>
+              <a:rPr lang="en-US" sz="1000" dirty="0" smtClean="0"/>
+              <a:t> </a:t>
+            </a:r>
+            <a:r>
+              <a:rPr lang="en-US" sz="1000" dirty="0" err="1"/>
+              <a:t>git</a:t>
+            </a:r>
+            <a:r>
+              <a:rPr lang="en-US" sz="1000" dirty="0"/>
+              <a:t> checkout </a:t>
+            </a:r>
+            <a:r>
+              <a:rPr lang="en-US" sz="1000" dirty="0" smtClean="0"/>
+              <a:t>develop</a:t>
+            </a:r>
+          </a:p>
+          <a:p>
+            <a:r>
+              <a:rPr lang="en-US" sz="1000" dirty="0" smtClean="0"/>
+              <a:t>$  </a:t>
+            </a:r>
+            <a:r>
+              <a:rPr lang="en-US" sz="1000" dirty="0" err="1" smtClean="0"/>
+              <a:t>git</a:t>
+            </a:r>
+            <a:r>
+              <a:rPr lang="en-US" sz="1000" dirty="0" smtClean="0"/>
+              <a:t> </a:t>
+            </a:r>
+            <a:r>
+              <a:rPr lang="en-US" sz="1000" dirty="0"/>
+              <a:t>merge --no-</a:t>
+            </a:r>
+            <a:r>
+              <a:rPr lang="en-US" sz="1000" dirty="0" err="1"/>
+              <a:t>ff</a:t>
+            </a:r>
+            <a:r>
+              <a:rPr lang="en-US" sz="1000" dirty="0"/>
+              <a:t> </a:t>
+            </a:r>
+            <a:r>
+              <a:rPr lang="en-US" sz="1000" dirty="0" err="1" smtClean="0"/>
+              <a:t>suhendra</a:t>
+            </a:r>
+            <a:r>
+              <a:rPr lang="en-US" sz="1000" dirty="0" smtClean="0"/>
+              <a:t>-ep-</a:t>
+            </a:r>
+            <a:r>
+              <a:rPr lang="en-US" sz="1000" dirty="0" err="1" smtClean="0"/>
+              <a:t>feature_branch</a:t>
+            </a:r>
+            <a:endParaRPr lang="en-US" sz="1000" dirty="0" smtClean="0"/>
+          </a:p>
+          <a:p>
+            <a:r>
+              <a:rPr lang="en-US" sz="1000" dirty="0" smtClean="0"/>
+              <a:t>$  </a:t>
+            </a:r>
+            <a:r>
+              <a:rPr lang="en-US" sz="1000" dirty="0" err="1" smtClean="0"/>
+              <a:t>git</a:t>
+            </a:r>
+            <a:r>
+              <a:rPr lang="en-US" sz="1000" dirty="0" smtClean="0"/>
+              <a:t> </a:t>
+            </a:r>
+            <a:r>
+              <a:rPr lang="en-US" sz="1000" dirty="0"/>
+              <a:t>push origin </a:t>
+            </a:r>
+            <a:r>
+              <a:rPr lang="en-US" sz="1000" dirty="0" smtClean="0"/>
+              <a:t>develop</a:t>
+            </a:r>
+            <a:endParaRPr lang="en-US" sz="1000" dirty="0"/>
           </a:p>
         </p:txBody>
       </p:sp>
     </p:spTree>
     <p:extLst>
       <p:ext uri="{BB962C8B-B14F-4D97-AF65-F5344CB8AC3E}">
-        <p14:creationId xmlns:p14="http://schemas.microsoft.com/office/powerpoint/2010/main" val="3899566160"/>
+        <p14:creationId xmlns:p14="http://schemas.microsoft.com/office/powerpoint/2010/main" val="2370776355"/>
       </p:ext>
     </p:extLst>
   </p:cSld>
@@ -3972,6 +4581,266 @@
         </p:nvSpPr>
         <p:spPr>
           <a:xfrm>
+            <a:off x="332656" y="195486"/>
+            <a:ext cx="6192688" cy="369332"/>
+          </a:xfrm>
+          <a:prstGeom prst="rect">
+            <a:avLst/>
+          </a:prstGeom>
+          <a:noFill/>
+        </p:spPr>
+        <p:txBody>
+          <a:bodyPr wrap="square" rtlCol="0">
+            <a:spAutoFit/>
+          </a:bodyPr>
+          <a:lstStyle/>
+          <a:p>
+            <a:r>
+              <a:rPr lang="en-ID" b="1" dirty="0">
+                <a:solidFill>
+                  <a:srgbClr val="392900"/>
+                </a:solidFill>
+                <a:latin typeface="Bookman Old Style" panose="02050604050505020204" pitchFamily="18" charset="0"/>
+              </a:rPr>
+              <a:t>CDC – git fork &amp; pull request </a:t>
+            </a:r>
+            <a:r>
+              <a:rPr lang="en-ID" b="1" dirty="0" smtClean="0">
+                <a:solidFill>
+                  <a:srgbClr val="392900"/>
+                </a:solidFill>
+                <a:latin typeface="Bookman Old Style" panose="02050604050505020204" pitchFamily="18" charset="0"/>
+              </a:rPr>
+              <a:t>/ Close pull request</a:t>
+            </a:r>
+            <a:endParaRPr lang="en-US" b="1" dirty="0">
+              <a:solidFill>
+                <a:srgbClr val="392900"/>
+              </a:solidFill>
+              <a:latin typeface="Bookman Old Style" panose="02050604050505020204" pitchFamily="18" charset="0"/>
+            </a:endParaRPr>
+          </a:p>
+        </p:txBody>
+      </p:sp>
+      <p:sp>
+        <p:nvSpPr>
+          <p:cNvPr id="7" name="TextBox 6"/>
+          <p:cNvSpPr txBox="1"/>
+          <p:nvPr/>
+        </p:nvSpPr>
+        <p:spPr>
+          <a:xfrm>
+            <a:off x="332656" y="555526"/>
+            <a:ext cx="4392488" cy="307777"/>
+          </a:xfrm>
+          <a:prstGeom prst="rect">
+            <a:avLst/>
+          </a:prstGeom>
+          <a:noFill/>
+        </p:spPr>
+        <p:txBody>
+          <a:bodyPr wrap="square" rtlCol="0">
+            <a:spAutoFit/>
+          </a:bodyPr>
+          <a:lstStyle/>
+          <a:p>
+            <a:pPr marL="285750" indent="-285750">
+              <a:buFont typeface="Wingdings" panose="05000000000000000000" pitchFamily="2" charset="2"/>
+              <a:buChar char="Ø"/>
+            </a:pPr>
+            <a:r>
+              <a:rPr lang="en-US" sz="1400" dirty="0" smtClean="0"/>
+              <a:t>Project owner happy, merge pull request and close!</a:t>
+            </a:r>
+            <a:endParaRPr lang="en-US" sz="1400" dirty="0"/>
+          </a:p>
+        </p:txBody>
+      </p:sp>
+      <p:pic>
+        <p:nvPicPr>
+          <p:cNvPr id="3" name="Picture 2"/>
+          <p:cNvPicPr>
+            <a:picLocks noChangeAspect="1"/>
+          </p:cNvPicPr>
+          <p:nvPr/>
+        </p:nvPicPr>
+        <p:blipFill>
+          <a:blip r:embed="rId3"/>
+          <a:stretch>
+            <a:fillRect/>
+          </a:stretch>
+        </p:blipFill>
+        <p:spPr>
+          <a:xfrm>
+            <a:off x="663707" y="843558"/>
+            <a:ext cx="4249659" cy="1069667"/>
+          </a:xfrm>
+          <a:prstGeom prst="rect">
+            <a:avLst/>
+          </a:prstGeom>
+        </p:spPr>
+      </p:pic>
+      <p:sp>
+        <p:nvSpPr>
+          <p:cNvPr id="9" name="TextBox 8"/>
+          <p:cNvSpPr txBox="1"/>
+          <p:nvPr/>
+        </p:nvSpPr>
+        <p:spPr>
+          <a:xfrm>
+            <a:off x="332656" y="3507854"/>
+            <a:ext cx="4392488" cy="307777"/>
+          </a:xfrm>
+          <a:prstGeom prst="rect">
+            <a:avLst/>
+          </a:prstGeom>
+          <a:noFill/>
+        </p:spPr>
+        <p:txBody>
+          <a:bodyPr wrap="square" rtlCol="0">
+            <a:spAutoFit/>
+          </a:bodyPr>
+          <a:lstStyle/>
+          <a:p>
+            <a:pPr marL="285750" indent="-285750">
+              <a:buFont typeface="Wingdings" panose="05000000000000000000" pitchFamily="2" charset="2"/>
+              <a:buChar char="Ø"/>
+            </a:pPr>
+            <a:r>
+              <a:rPr lang="en-US" sz="1400" dirty="0" smtClean="0"/>
+              <a:t>Contributor </a:t>
+            </a:r>
+            <a:r>
+              <a:rPr lang="en-US" sz="1400" dirty="0"/>
+              <a:t>may sync  </a:t>
+            </a:r>
+            <a:r>
+              <a:rPr lang="en-US" sz="1400" dirty="0" smtClean="0"/>
+              <a:t>the forked repository</a:t>
+            </a:r>
+            <a:endParaRPr lang="en-US" sz="1400" dirty="0"/>
+          </a:p>
+        </p:txBody>
+      </p:sp>
+      <p:sp>
+        <p:nvSpPr>
+          <p:cNvPr id="10" name="TextBox 9"/>
+          <p:cNvSpPr txBox="1"/>
+          <p:nvPr/>
+        </p:nvSpPr>
+        <p:spPr>
+          <a:xfrm>
+            <a:off x="476672" y="3867894"/>
+            <a:ext cx="5544616" cy="276999"/>
+          </a:xfrm>
+          <a:prstGeom prst="rect">
+            <a:avLst/>
+          </a:prstGeom>
+        </p:spPr>
+        <p:style>
+          <a:lnRef idx="0">
+            <a:schemeClr val="dk1"/>
+          </a:lnRef>
+          <a:fillRef idx="3">
+            <a:schemeClr val="dk1"/>
+          </a:fillRef>
+          <a:effectRef idx="3">
+            <a:schemeClr val="dk1"/>
+          </a:effectRef>
+          <a:fontRef idx="minor">
+            <a:schemeClr val="lt1"/>
+          </a:fontRef>
+        </p:style>
+        <p:txBody>
+          <a:bodyPr wrap="square" rtlCol="0">
+            <a:spAutoFit/>
+          </a:bodyPr>
+          <a:lstStyle/>
+          <a:p>
+            <a:r>
+              <a:rPr lang="en-US" sz="1200" dirty="0"/>
+              <a:t>$ </a:t>
+            </a:r>
+            <a:r>
+              <a:rPr lang="en-US" sz="1200" dirty="0" err="1"/>
+              <a:t>git</a:t>
+            </a:r>
+            <a:r>
+              <a:rPr lang="en-US" sz="1200" dirty="0"/>
+              <a:t> pull upstream develop</a:t>
+            </a:r>
+          </a:p>
+        </p:txBody>
+      </p:sp>
+      <p:pic>
+        <p:nvPicPr>
+          <p:cNvPr id="8" name="Picture 7"/>
+          <p:cNvPicPr>
+            <a:picLocks noChangeAspect="1"/>
+          </p:cNvPicPr>
+          <p:nvPr/>
+        </p:nvPicPr>
+        <p:blipFill>
+          <a:blip r:embed="rId4"/>
+          <a:stretch>
+            <a:fillRect/>
+          </a:stretch>
+        </p:blipFill>
+        <p:spPr>
+          <a:xfrm>
+            <a:off x="691509" y="1995686"/>
+            <a:ext cx="4249659" cy="1325203"/>
+          </a:xfrm>
+          <a:prstGeom prst="rect">
+            <a:avLst/>
+          </a:prstGeom>
+        </p:spPr>
+      </p:pic>
+    </p:spTree>
+    <p:extLst>
+      <p:ext uri="{BB962C8B-B14F-4D97-AF65-F5344CB8AC3E}">
+        <p14:creationId xmlns:p14="http://schemas.microsoft.com/office/powerpoint/2010/main" val="3899566160"/>
+      </p:ext>
+    </p:extLst>
+  </p:cSld>
+  <p:clrMapOvr>
+    <a:masterClrMapping/>
+  </p:clrMapOvr>
+  <p:timing>
+    <p:tnLst>
+      <p:par>
+        <p:cTn id="1" dur="indefinite" restart="never" nodeType="tmRoot"/>
+      </p:par>
+    </p:tnLst>
+  </p:timing>
+</p:sld>
+</file>
+
+<file path=ppt/slides/slide12.xml><?xml version="1.0" encoding="utf-8"?>
+<p:sld xmlns:a="http://schemas.openxmlformats.org/drawingml/2006/main" xmlns:r="http://schemas.openxmlformats.org/officeDocument/2006/relationships" xmlns:p="http://schemas.openxmlformats.org/presentationml/2006/main">
+  <p:cSld>
+    <p:spTree>
+      <p:nvGrpSpPr>
+        <p:cNvPr id="1" name=""/>
+        <p:cNvGrpSpPr/>
+        <p:nvPr/>
+      </p:nvGrpSpPr>
+      <p:grpSpPr>
+        <a:xfrm>
+          <a:off x="0" y="0"/>
+          <a:ext cx="0" cy="0"/>
+          <a:chOff x="0" y="0"/>
+          <a:chExt cx="0" cy="0"/>
+        </a:xfrm>
+      </p:grpSpPr>
+      <p:sp>
+        <p:nvSpPr>
+          <p:cNvPr id="11" name="TextBox 10"/>
+          <p:cNvSpPr txBox="1"/>
+          <p:nvPr/>
+        </p:nvSpPr>
+        <p:spPr>
+          <a:xfrm>
             <a:off x="485056" y="923950"/>
             <a:ext cx="6256312" cy="2554545"/>
           </a:xfrm>
@@ -4079,7 +4948,6 @@
               <a:rPr lang="en-ID" sz="1600" dirty="0" smtClean="0"/>
               <a:t>Sync the forked repository</a:t>
             </a:r>
-            <a:endParaRPr lang="en-ID" sz="1600" dirty="0" smtClean="0"/>
           </a:p>
         </p:txBody>
       </p:sp>
@@ -4216,11 +5084,7 @@
             </a:pPr>
             <a:r>
               <a:rPr lang="en-ID" dirty="0" smtClean="0"/>
-              <a:t>Git </a:t>
-            </a:r>
-            <a:r>
-              <a:rPr lang="en-ID" dirty="0" smtClean="0"/>
-              <a:t>installed with any console/command line tool</a:t>
+              <a:t>Git installed with any console/command line tool</a:t>
             </a:r>
           </a:p>
           <a:p>
@@ -5371,16 +6235,7 @@
                 </a:solidFill>
                 <a:latin typeface="Bookman Old Style" panose="02050604050505020204" pitchFamily="18" charset="0"/>
               </a:rPr>
-              <a:t>/Fork </a:t>
-            </a:r>
-            <a:r>
-              <a:rPr lang="en-ID" b="1" dirty="0" smtClean="0">
-                <a:solidFill>
-                  <a:srgbClr val="392900"/>
-                </a:solidFill>
-                <a:latin typeface="Bookman Old Style" panose="02050604050505020204" pitchFamily="18" charset="0"/>
-              </a:rPr>
-              <a:t>Repository</a:t>
+              <a:t>/Fork Repository</a:t>
             </a:r>
             <a:endParaRPr lang="en-US" b="1" dirty="0">
               <a:solidFill>
@@ -5464,7 +6319,6 @@
               <a:rPr lang="en-US" sz="1200" dirty="0"/>
               <a:t>https://github.com/mitrais-cdc-training/ws3</a:t>
             </a:r>
-            <a:endParaRPr lang="en-US" sz="1200" dirty="0"/>
           </a:p>
         </p:txBody>
       </p:sp>
@@ -5835,11 +6689,7 @@
             </a:r>
             <a:r>
               <a:rPr lang="en-US" sz="1200" dirty="0" err="1" smtClean="0"/>
-              <a:t>feature</a:t>
-            </a:r>
-            <a:r>
-              <a:rPr lang="en-US" sz="1200" dirty="0" err="1" smtClean="0"/>
-              <a:t>_branch</a:t>
+              <a:t>feature_branch</a:t>
             </a:r>
             <a:endParaRPr lang="en-US" sz="1200" dirty="0"/>
           </a:p>
@@ -5977,11 +6827,7 @@
             </a:r>
             <a:r>
               <a:rPr lang="en-US" sz="1200" dirty="0" err="1" smtClean="0"/>
-              <a:t>feature</a:t>
-            </a:r>
-            <a:r>
-              <a:rPr lang="en-US" sz="1200" dirty="0" err="1" smtClean="0"/>
-              <a:t>_branch</a:t>
+              <a:t>feature_branch</a:t>
             </a:r>
             <a:endParaRPr lang="en-US" sz="1200" dirty="0"/>
           </a:p>
@@ -6076,7 +6922,6 @@
               <a:rPr lang="en-US" sz="1200" dirty="0"/>
               <a:t> remote add upstream https://github.com/mitrais-cdc-training/ws3.git</a:t>
             </a:r>
-            <a:endParaRPr lang="en-US" sz="1200" dirty="0"/>
           </a:p>
           <a:p>
             <a:endParaRPr lang="en-US" sz="1200" dirty="0" smtClean="0"/>
@@ -6094,7 +6939,6 @@
               <a:rPr lang="en-US" sz="1200" dirty="0"/>
               <a:t>remote repository</a:t>
             </a:r>
-            <a:endParaRPr lang="en-US" sz="1200" dirty="0"/>
           </a:p>
           <a:p>
             <a:r>
@@ -6109,7 +6953,6 @@
               <a:rPr lang="en-US" sz="1200" dirty="0"/>
               <a:t> remote -v</a:t>
             </a:r>
-            <a:endParaRPr lang="en-US" sz="1200" dirty="0"/>
           </a:p>
         </p:txBody>
       </p:sp>
@@ -6188,16 +7031,7 @@
                 </a:solidFill>
                 <a:latin typeface="Bookman Old Style" panose="02050604050505020204" pitchFamily="18" charset="0"/>
               </a:rPr>
-              <a:t>request/</a:t>
-            </a:r>
-            <a:r>
-              <a:rPr lang="en-ID" b="1" dirty="0" smtClean="0">
-                <a:solidFill>
-                  <a:srgbClr val="392900"/>
-                </a:solidFill>
-                <a:latin typeface="Bookman Old Style" panose="02050604050505020204" pitchFamily="18" charset="0"/>
-              </a:rPr>
-              <a:t>Create Pull Request</a:t>
+              <a:t>request/Create Pull Request</a:t>
             </a:r>
             <a:endParaRPr lang="en-US" b="1" dirty="0">
               <a:solidFill>
@@ -6676,16 +7510,7 @@
                 </a:solidFill>
                 <a:latin typeface="Bookman Old Style" panose="02050604050505020204" pitchFamily="18" charset="0"/>
               </a:rPr>
-              <a:t>request/</a:t>
-            </a:r>
-            <a:r>
-              <a:rPr lang="en-ID" b="1" dirty="0" smtClean="0">
-                <a:solidFill>
-                  <a:srgbClr val="392900"/>
-                </a:solidFill>
-                <a:latin typeface="Bookman Old Style" panose="02050604050505020204" pitchFamily="18" charset="0"/>
-              </a:rPr>
-              <a:t>Review the changes</a:t>
+              <a:t>request/Review the changes</a:t>
             </a:r>
             <a:endParaRPr lang="en-US" b="1" dirty="0">
               <a:solidFill>
@@ -6724,7 +7549,15 @@
             </a:pPr>
             <a:r>
               <a:rPr lang="en-US" sz="1400" dirty="0" smtClean="0"/>
-              <a:t>Project owner review the pull request</a:t>
+              <a:t>Project owner </a:t>
+            </a:r>
+            <a:r>
+              <a:rPr lang="en-US" sz="1400" dirty="0" smtClean="0"/>
+              <a:t>have a look on the </a:t>
+            </a:r>
+            <a:r>
+              <a:rPr lang="en-US" sz="1400" dirty="0" smtClean="0"/>
+              <a:t>pull request</a:t>
             </a:r>
             <a:endParaRPr lang="en-US" sz="1400" dirty="0"/>
           </a:p>
@@ -6732,7 +7565,7 @@
       </p:sp>
       <p:pic>
         <p:nvPicPr>
-          <p:cNvPr id="5" name="Picture 4"/>
+          <p:cNvPr id="2" name="Picture 1"/>
           <p:cNvPicPr>
             <a:picLocks noChangeAspect="1"/>
           </p:cNvPicPr>
@@ -6746,51 +7579,17 @@
         </p:blipFill>
         <p:spPr>
           <a:xfrm>
-            <a:off x="352931" y="2715766"/>
-            <a:ext cx="3580124" cy="1814719"/>
+            <a:off x="188640" y="657711"/>
+            <a:ext cx="3744415" cy="1698015"/>
           </a:xfrm>
           <a:prstGeom prst="rect">
             <a:avLst/>
           </a:prstGeom>
         </p:spPr>
       </p:pic>
-      <p:sp>
-        <p:nvSpPr>
-          <p:cNvPr id="9" name="TextBox 8"/>
-          <p:cNvSpPr txBox="1"/>
-          <p:nvPr/>
-        </p:nvSpPr>
-        <p:spPr>
-          <a:xfrm>
-            <a:off x="4077072" y="2715766"/>
-            <a:ext cx="2748479" cy="523220"/>
-          </a:xfrm>
-          <a:prstGeom prst="rect">
-            <a:avLst/>
-          </a:prstGeom>
-          <a:noFill/>
-        </p:spPr>
-        <p:txBody>
-          <a:bodyPr wrap="square" rtlCol="0">
-            <a:spAutoFit/>
-          </a:bodyPr>
-          <a:lstStyle/>
-          <a:p>
-            <a:pPr marL="285750" indent="-285750">
-              <a:buFont typeface="Wingdings" panose="05000000000000000000" pitchFamily="2" charset="2"/>
-              <a:buChar char="Ø"/>
-            </a:pPr>
-            <a:r>
-              <a:rPr lang="en-US" sz="1400" dirty="0" smtClean="0"/>
-              <a:t>Project owner and contributor may have discussion</a:t>
-            </a:r>
-            <a:endParaRPr lang="en-US" sz="1400" dirty="0"/>
-          </a:p>
-        </p:txBody>
-      </p:sp>
       <p:pic>
         <p:nvPicPr>
-          <p:cNvPr id="2" name="Picture 1"/>
+          <p:cNvPr id="3" name="Picture 2"/>
           <p:cNvPicPr>
             <a:picLocks noChangeAspect="1"/>
           </p:cNvPicPr>
@@ -6804,14 +7603,97 @@
         </p:blipFill>
         <p:spPr>
           <a:xfrm>
-            <a:off x="188640" y="657711"/>
-            <a:ext cx="3744415" cy="1842031"/>
+            <a:off x="332656" y="2571750"/>
+            <a:ext cx="3600399" cy="2009774"/>
           </a:xfrm>
           <a:prstGeom prst="rect">
             <a:avLst/>
           </a:prstGeom>
         </p:spPr>
       </p:pic>
+      <p:sp>
+        <p:nvSpPr>
+          <p:cNvPr id="8" name="TextBox 7"/>
+          <p:cNvSpPr txBox="1"/>
+          <p:nvPr/>
+        </p:nvSpPr>
+        <p:spPr>
+          <a:xfrm>
+            <a:off x="3933056" y="2605683"/>
+            <a:ext cx="2924944" cy="1169551"/>
+          </a:xfrm>
+          <a:prstGeom prst="rect">
+            <a:avLst/>
+          </a:prstGeom>
+          <a:noFill/>
+        </p:spPr>
+        <p:txBody>
+          <a:bodyPr wrap="square" rtlCol="0">
+            <a:spAutoFit/>
+          </a:bodyPr>
+          <a:lstStyle/>
+          <a:p>
+            <a:pPr marL="285750" indent="-285750">
+              <a:buFont typeface="Wingdings" panose="05000000000000000000" pitchFamily="2" charset="2"/>
+              <a:buChar char="Ø"/>
+            </a:pPr>
+            <a:r>
+              <a:rPr lang="en-US" sz="1400" dirty="0" smtClean="0"/>
+              <a:t>Project </a:t>
+            </a:r>
+            <a:r>
+              <a:rPr lang="en-US" sz="1400" dirty="0" smtClean="0"/>
+              <a:t>owner </a:t>
+            </a:r>
+            <a:r>
+              <a:rPr lang="en-US" sz="1400" dirty="0" smtClean="0"/>
+              <a:t>review the changes. </a:t>
+            </a:r>
+            <a:br>
+              <a:rPr lang="en-US" sz="1400" dirty="0" smtClean="0"/>
+            </a:br>
+            <a:r>
+              <a:rPr lang="en-US" sz="1400" dirty="0" smtClean="0"/>
+              <a:t>- </a:t>
+            </a:r>
+            <a:r>
+              <a:rPr lang="en-US" sz="1400" i="1" dirty="0" smtClean="0"/>
+              <a:t>Comment</a:t>
+            </a:r>
+            <a:r>
+              <a:rPr lang="en-US" sz="1400" dirty="0" smtClean="0"/>
+              <a:t/>
+            </a:r>
+            <a:br>
+              <a:rPr lang="en-US" sz="1400" dirty="0" smtClean="0"/>
+            </a:br>
+            <a:r>
+              <a:rPr lang="en-US" sz="1400" dirty="0" smtClean="0"/>
+              <a:t>- </a:t>
+            </a:r>
+            <a:r>
+              <a:rPr lang="en-US" sz="1400" i="1" dirty="0" smtClean="0"/>
+              <a:t>Approve</a:t>
+            </a:r>
+            <a:r>
+              <a:rPr lang="en-US" sz="1400" dirty="0" smtClean="0"/>
+              <a:t/>
+            </a:r>
+            <a:br>
+              <a:rPr lang="en-US" sz="1400" dirty="0" smtClean="0"/>
+            </a:br>
+            <a:r>
+              <a:rPr lang="en-US" sz="1400" dirty="0" smtClean="0"/>
+              <a:t>- </a:t>
+            </a:r>
+            <a:r>
+              <a:rPr lang="en-US" sz="1400" i="1" dirty="0" smtClean="0"/>
+              <a:t>Request changes</a:t>
+            </a:r>
+            <a:endParaRPr lang="en-US" sz="1400" i="1" dirty="0"/>
+          </a:p>
+        </p:txBody>
+      </p:sp>
     </p:spTree>
     <p:extLst>
       <p:ext uri="{BB962C8B-B14F-4D97-AF65-F5344CB8AC3E}">
@@ -7479,18 +8361,18 @@
 </file>
 
 <file path=customXml/item2.xml><?xml version="1.0" encoding="utf-8"?>
+<p:properties xmlns:p="http://schemas.microsoft.com/office/2006/metadata/properties" xmlns:xsi="http://www.w3.org/2001/XMLSchema-instance" xmlns:pc="http://schemas.microsoft.com/office/infopath/2007/PartnerControls">
+  <documentManagement/>
+</p:properties>
+</file>
+
+<file path=customXml/item3.xml><?xml version="1.0" encoding="utf-8"?>
 <?mso-contentType ?>
 <FormTemplates xmlns="http://schemas.microsoft.com/sharepoint/v3/contenttype/forms">
   <Display>DocumentLibraryForm</Display>
   <Edit>DocumentLibraryForm</Edit>
   <New>DocumentLibraryForm</New>
 </FormTemplates>
-</file>
-
-<file path=customXml/item3.xml><?xml version="1.0" encoding="utf-8"?>
-<p:properties xmlns:p="http://schemas.microsoft.com/office/2006/metadata/properties" xmlns:xsi="http://www.w3.org/2001/XMLSchema-instance" xmlns:pc="http://schemas.microsoft.com/office/infopath/2007/PartnerControls">
-  <documentManagement/>
-</p:properties>
 </file>
 
 <file path=customXml/itemProps1.xml><?xml version="1.0" encoding="utf-8"?>
@@ -7510,14 +8392,6 @@
 </file>
 
 <file path=customXml/itemProps2.xml><?xml version="1.0" encoding="utf-8"?>
-<ds:datastoreItem xmlns:ds="http://schemas.openxmlformats.org/officeDocument/2006/customXml" ds:itemID="{DB5E681D-860B-4D22-80CF-C7472F8C312F}">
-  <ds:schemaRefs>
-    <ds:schemaRef ds:uri="http://schemas.microsoft.com/sharepoint/v3/contenttype/forms"/>
-  </ds:schemaRefs>
-</ds:datastoreItem>
-</file>
-
-<file path=customXml/itemProps3.xml><?xml version="1.0" encoding="utf-8"?>
 <ds:datastoreItem xmlns:ds="http://schemas.openxmlformats.org/officeDocument/2006/customXml" ds:itemID="{12B43294-76B4-4246-849F-628E6870A5FD}">
   <ds:schemaRefs>
     <ds:schemaRef ds:uri="http://schemas.microsoft.com/office/2006/documentManagement/types"/>
@@ -7530,4 +8404,12 @@
     <ds:schemaRef ds:uri="http://www.w3.org/XML/1998/namespace"/>
   </ds:schemaRefs>
 </ds:datastoreItem>
+</file>
+
+<file path=customXml/itemProps3.xml><?xml version="1.0" encoding="utf-8"?>
+<ds:datastoreItem xmlns:ds="http://schemas.openxmlformats.org/officeDocument/2006/customXml" ds:itemID="{DB5E681D-860B-4D22-80CF-C7472F8C312F}">
+  <ds:schemaRefs>
+    <ds:schemaRef ds:uri="http://schemas.microsoft.com/sharepoint/v3/contenttype/forms"/>
+  </ds:schemaRefs>
+</ds:datastoreItem>
 </file>
</xml_diff>

<commit_message>
Add steps to resolve conflict for contributor
</commit_message>
<xml_diff>
--- a/cdc_git_ws3.pptx
+++ b/cdc_git_ws3.pptx
@@ -18,7 +18,7 @@
     <p:sldId id="313" r:id="rId12"/>
     <p:sldId id="315" r:id="rId13"/>
     <p:sldId id="318" r:id="rId14"/>
-    <p:sldId id="317" r:id="rId15"/>
+    <p:sldId id="319" r:id="rId15"/>
     <p:sldId id="309" r:id="rId16"/>
   </p:sldIdLst>
   <p:sldSz cx="6858000" cy="5143500"/>
@@ -888,7 +888,177 @@
           <a:bodyPr/>
           <a:lstStyle/>
           <a:p>
+            <a:r>
+              <a:rPr lang="en-US" dirty="0" smtClean="0"/>
+              <a:t>Conflict may happened</a:t>
+            </a:r>
+            <a:r>
+              <a:rPr lang="en-US" baseline="0" dirty="0" smtClean="0"/>
+              <a:t> here. Github will notify branch has conflicts that must be resolved.</a:t>
+            </a:r>
+          </a:p>
+          <a:p>
+            <a:r>
+              <a:rPr lang="en-US" baseline="0" dirty="0" smtClean="0"/>
+              <a:t>There are 2 options: </a:t>
+            </a:r>
+          </a:p>
+          <a:p>
+            <a:pPr marL="228600" indent="-228600">
+              <a:buAutoNum type="arabicPeriod"/>
+            </a:pPr>
+            <a:r>
+              <a:rPr lang="en-US" b="1" baseline="0" dirty="0" smtClean="0"/>
+              <a:t>The project owner solve it manually</a:t>
+            </a:r>
+          </a:p>
+          <a:p>
+            <a:pPr marL="0" indent="0">
+              <a:buNone/>
+            </a:pPr>
             <a:endParaRPr lang="en-US" baseline="0" dirty="0" smtClean="0"/>
+          </a:p>
+          <a:p>
+            <a:r>
+              <a:rPr lang="en-US" b="1" dirty="0" smtClean="0"/>
+              <a:t>Step 1:</a:t>
+            </a:r>
+            <a:r>
+              <a:rPr lang="en-US" dirty="0" smtClean="0"/>
+              <a:t> From your project repository, check out a new branch and test the changes.</a:t>
+            </a:r>
+          </a:p>
+          <a:p>
+            <a:r>
+              <a:rPr lang="en-US" dirty="0" smtClean="0"/>
+              <a:t>$ </a:t>
+            </a:r>
+            <a:r>
+              <a:rPr lang="en-US" dirty="0" err="1" smtClean="0"/>
+              <a:t>git</a:t>
+            </a:r>
+            <a:r>
+              <a:rPr lang="en-US" dirty="0" smtClean="0"/>
+              <a:t> checkout -b </a:t>
+            </a:r>
+            <a:r>
+              <a:rPr lang="en-US" dirty="0" err="1" smtClean="0"/>
+              <a:t>suhendra</a:t>
+            </a:r>
+            <a:r>
+              <a:rPr lang="en-US" dirty="0" smtClean="0"/>
+              <a:t>-ep-</a:t>
+            </a:r>
+            <a:r>
+              <a:rPr lang="en-US" dirty="0" err="1" smtClean="0"/>
+              <a:t>feature_branch</a:t>
+            </a:r>
+            <a:r>
+              <a:rPr lang="en-US" dirty="0" smtClean="0"/>
+              <a:t> develop </a:t>
+            </a:r>
+          </a:p>
+          <a:p>
+            <a:r>
+              <a:rPr lang="en-US" dirty="0" smtClean="0"/>
+              <a:t>$ </a:t>
+            </a:r>
+            <a:r>
+              <a:rPr lang="en-US" dirty="0" err="1" smtClean="0"/>
+              <a:t>git</a:t>
+            </a:r>
+            <a:r>
+              <a:rPr lang="en-US" dirty="0" smtClean="0"/>
+              <a:t> pull https://github.com/suhendra-ep/ws3.git </a:t>
+            </a:r>
+            <a:r>
+              <a:rPr lang="en-US" dirty="0" err="1" smtClean="0"/>
+              <a:t>feature_branch</a:t>
+            </a:r>
+            <a:r>
+              <a:rPr lang="en-US" dirty="0" smtClean="0"/>
+              <a:t> </a:t>
+            </a:r>
+          </a:p>
+          <a:p>
+            <a:r>
+              <a:rPr lang="en-US" b="1" dirty="0" smtClean="0"/>
+              <a:t>Step 2:</a:t>
+            </a:r>
+            <a:r>
+              <a:rPr lang="en-US" dirty="0" smtClean="0"/>
+              <a:t> Merge the changes and update on GitHub.</a:t>
+            </a:r>
+          </a:p>
+          <a:p>
+            <a:r>
+              <a:rPr lang="en-US" dirty="0" smtClean="0"/>
+              <a:t>$ </a:t>
+            </a:r>
+            <a:r>
+              <a:rPr lang="en-US" dirty="0" err="1" smtClean="0"/>
+              <a:t>git</a:t>
+            </a:r>
+            <a:r>
+              <a:rPr lang="en-US" dirty="0" smtClean="0"/>
+              <a:t> checkout develop</a:t>
+            </a:r>
+          </a:p>
+          <a:p>
+            <a:r>
+              <a:rPr lang="en-US" dirty="0" smtClean="0"/>
+              <a:t>$ </a:t>
+            </a:r>
+            <a:r>
+              <a:rPr lang="en-US" dirty="0" err="1" smtClean="0"/>
+              <a:t>git</a:t>
+            </a:r>
+            <a:r>
+              <a:rPr lang="en-US" dirty="0" smtClean="0"/>
+              <a:t> merge --no-</a:t>
+            </a:r>
+            <a:r>
+              <a:rPr lang="en-US" dirty="0" err="1" smtClean="0"/>
+              <a:t>ff</a:t>
+            </a:r>
+            <a:r>
+              <a:rPr lang="en-US" dirty="0" smtClean="0"/>
+              <a:t> </a:t>
+            </a:r>
+            <a:r>
+              <a:rPr lang="en-US" dirty="0" err="1" smtClean="0"/>
+              <a:t>suhendra</a:t>
+            </a:r>
+            <a:r>
+              <a:rPr lang="en-US" dirty="0" smtClean="0"/>
+              <a:t>-ep-</a:t>
+            </a:r>
+            <a:r>
+              <a:rPr lang="en-US" dirty="0" err="1" smtClean="0"/>
+              <a:t>feature_branch</a:t>
+            </a:r>
+            <a:endParaRPr lang="en-US" dirty="0" smtClean="0"/>
+          </a:p>
+          <a:p>
+            <a:r>
+              <a:rPr lang="en-US" dirty="0" smtClean="0"/>
+              <a:t>$</a:t>
+            </a:r>
+            <a:r>
+              <a:rPr lang="en-US" baseline="0" dirty="0" smtClean="0"/>
+              <a:t> </a:t>
+            </a:r>
+            <a:r>
+              <a:rPr lang="en-US" dirty="0" err="1" smtClean="0"/>
+              <a:t>git</a:t>
+            </a:r>
+            <a:r>
+              <a:rPr lang="en-US" dirty="0" smtClean="0"/>
+              <a:t> push origin develop</a:t>
+            </a:r>
+          </a:p>
+          <a:p>
+            <a:endParaRPr lang="en-US" dirty="0"/>
           </a:p>
         </p:txBody>
       </p:sp>
@@ -918,7 +1088,7 @@
     </p:spTree>
     <p:extLst>
       <p:ext uri="{BB962C8B-B14F-4D97-AF65-F5344CB8AC3E}">
-        <p14:creationId xmlns:p14="http://schemas.microsoft.com/office/powerpoint/2010/main" val="1973261343"/>
+        <p14:creationId xmlns:p14="http://schemas.microsoft.com/office/powerpoint/2010/main" val="3410069988"/>
       </p:ext>
     </p:extLst>
   </p:cSld>
@@ -4064,11 +4234,7 @@
             </a:pPr>
             <a:r>
               <a:rPr lang="en-US" sz="1400" dirty="0" smtClean="0"/>
-              <a:t>Project owner </a:t>
-            </a:r>
-            <a:r>
-              <a:rPr lang="en-US" sz="1400" dirty="0" smtClean="0"/>
-              <a:t>and contributor may have discussion here.</a:t>
+              <a:t>Project owner and contributor may have discussion here.</a:t>
             </a:r>
             <a:endParaRPr lang="en-US" sz="1400" dirty="0"/>
           </a:p>
@@ -4179,7 +4345,7 @@
             </a:r>
             <a:r>
               <a:rPr lang="en-US" sz="1300" dirty="0" smtClean="0"/>
-              <a:t>!</a:t>
+              <a:t>! Here what you have to do:</a:t>
             </a:r>
             <a:endParaRPr lang="en-US" sz="1300" dirty="0"/>
           </a:p>
@@ -4187,14 +4353,14 @@
       </p:sp>
       <p:sp>
         <p:nvSpPr>
-          <p:cNvPr id="16" name="TextBox 15"/>
+          <p:cNvPr id="17" name="TextBox 16"/>
           <p:cNvSpPr txBox="1"/>
           <p:nvPr/>
         </p:nvSpPr>
         <p:spPr>
           <a:xfrm>
-            <a:off x="417637" y="2859782"/>
-            <a:ext cx="5832648" cy="307777"/>
+            <a:off x="692696" y="2931790"/>
+            <a:ext cx="5832648" cy="261610"/>
           </a:xfrm>
           <a:prstGeom prst="rect">
             <a:avLst/>
@@ -4207,52 +4373,6 @@
           </a:bodyPr>
           <a:lstStyle/>
           <a:p>
-            <a:pPr marL="285750" indent="-285750">
-              <a:buFont typeface="Wingdings" panose="05000000000000000000" pitchFamily="2" charset="2"/>
-              <a:buChar char="v"/>
-            </a:pPr>
-            <a:r>
-              <a:rPr lang="en-US" sz="1300" dirty="0" smtClean="0"/>
-              <a:t>OK. I will do it by myself. Here what I </a:t>
-            </a:r>
-            <a:r>
-              <a:rPr lang="en-US" sz="1300" dirty="0" err="1" smtClean="0"/>
-              <a:t>wanna</a:t>
-            </a:r>
-            <a:r>
-              <a:rPr lang="en-US" sz="1300" dirty="0" smtClean="0"/>
-              <a:t> do</a:t>
-            </a:r>
-            <a:r>
-              <a:rPr lang="en-US" sz="1400" dirty="0" smtClean="0"/>
-              <a:t>:</a:t>
-            </a:r>
-            <a:endParaRPr lang="en-US" sz="1400" dirty="0"/>
-          </a:p>
-        </p:txBody>
-      </p:sp>
-      <p:sp>
-        <p:nvSpPr>
-          <p:cNvPr id="17" name="TextBox 16"/>
-          <p:cNvSpPr txBox="1"/>
-          <p:nvPr/>
-        </p:nvSpPr>
-        <p:spPr>
-          <a:xfrm>
-            <a:off x="692696" y="3075806"/>
-            <a:ext cx="5832648" cy="261610"/>
-          </a:xfrm>
-          <a:prstGeom prst="rect">
-            <a:avLst/>
-          </a:prstGeom>
-          <a:noFill/>
-        </p:spPr>
-        <p:txBody>
-          <a:bodyPr wrap="square" rtlCol="0">
-            <a:spAutoFit/>
-          </a:bodyPr>
-          <a:lstStyle/>
-          <a:p>
             <a:r>
               <a:rPr lang="en-US" sz="1100" b="1" dirty="0"/>
               <a:t>Step 1:</a:t>
@@ -4263,15 +4383,15 @@
             </a:r>
             <a:r>
               <a:rPr lang="en-US" sz="1100" dirty="0" smtClean="0"/>
-              <a:t>my project </a:t>
+              <a:t>your forked repository</a:t>
             </a:r>
             <a:r>
               <a:rPr lang="en-US" sz="1100" dirty="0"/>
-              <a:t>repository, check out a new branch and test the changes</a:t>
+              <a:t>, </a:t>
             </a:r>
             <a:r>
               <a:rPr lang="en-US" sz="1100" dirty="0" smtClean="0"/>
-              <a:t>.</a:t>
+              <a:t> sync it to the original. </a:t>
             </a:r>
             <a:endParaRPr lang="en-US" sz="1100" dirty="0"/>
           </a:p>
@@ -4285,8 +4405,8 @@
         </p:nvSpPr>
         <p:spPr>
           <a:xfrm>
-            <a:off x="764703" y="3323768"/>
-            <a:ext cx="5485581" cy="400110"/>
+            <a:off x="764703" y="3179752"/>
+            <a:ext cx="5485581" cy="246221"/>
           </a:xfrm>
           <a:prstGeom prst="rect">
             <a:avLst/>
@@ -4325,52 +4445,10 @@
               <a:t> </a:t>
             </a:r>
             <a:r>
-              <a:rPr lang="en-US" sz="1000" dirty="0"/>
-              <a:t>checkout -b </a:t>
-            </a:r>
-            <a:r>
-              <a:rPr lang="en-US" sz="1000" dirty="0" err="1"/>
-              <a:t>suhendra</a:t>
-            </a:r>
-            <a:r>
-              <a:rPr lang="en-US" sz="1000" dirty="0"/>
-              <a:t>-ep-</a:t>
-            </a:r>
-            <a:r>
-              <a:rPr lang="en-US" sz="1000" dirty="0" err="1"/>
-              <a:t>feature_branch</a:t>
-            </a:r>
-            <a:r>
-              <a:rPr lang="en-US" sz="1000" dirty="0"/>
-              <a:t> develop </a:t>
+              <a:rPr lang="en-US" sz="1000" dirty="0" smtClean="0"/>
+              <a:t>pull upstream develop</a:t>
             </a:r>
             <a:endParaRPr lang="en-US" sz="1000" dirty="0" smtClean="0"/>
-          </a:p>
-          <a:p>
-            <a:r>
-              <a:rPr lang="en-US" sz="1000" dirty="0" smtClean="0"/>
-              <a:t>$ </a:t>
-            </a:r>
-            <a:r>
-              <a:rPr lang="en-US" sz="1000" dirty="0" err="1" smtClean="0"/>
-              <a:t>git</a:t>
-            </a:r>
-            <a:r>
-              <a:rPr lang="en-US" sz="1000" dirty="0" smtClean="0"/>
-              <a:t> </a:t>
-            </a:r>
-            <a:r>
-              <a:rPr lang="en-US" sz="1000" dirty="0"/>
-              <a:t>pull https://github.com/suhendra-ep/ws3.git </a:t>
-            </a:r>
-            <a:r>
-              <a:rPr lang="en-US" sz="1000" dirty="0" err="1"/>
-              <a:t>feature_branch</a:t>
-            </a:r>
-            <a:r>
-              <a:rPr lang="en-US" sz="1000" dirty="0"/>
-              <a:t> </a:t>
-            </a:r>
           </a:p>
         </p:txBody>
       </p:sp>
@@ -4382,7 +4460,7 @@
         </p:nvSpPr>
         <p:spPr>
           <a:xfrm>
-            <a:off x="692696" y="3822308"/>
+            <a:off x="692696" y="3507854"/>
             <a:ext cx="5832648" cy="261610"/>
           </a:xfrm>
           <a:prstGeom prst="rect">
@@ -4406,7 +4484,15 @@
             </a:r>
             <a:r>
               <a:rPr lang="en-US" sz="1100" dirty="0"/>
-              <a:t> Merge the changes and update on GitHub</a:t>
+              <a:t> Merge </a:t>
+            </a:r>
+            <a:r>
+              <a:rPr lang="en-US" sz="1100" dirty="0" smtClean="0"/>
+              <a:t>your feature branch to the base branch and </a:t>
+            </a:r>
+            <a:r>
+              <a:rPr lang="en-US" sz="1100" dirty="0"/>
+              <a:t>update on GitHub</a:t>
             </a:r>
             <a:r>
               <a:rPr lang="en-US" sz="1100" dirty="0" smtClean="0"/>
@@ -4424,8 +4510,8 @@
         </p:nvSpPr>
         <p:spPr>
           <a:xfrm>
-            <a:off x="764704" y="4083918"/>
-            <a:ext cx="5485580" cy="553998"/>
+            <a:off x="751732" y="3880088"/>
+            <a:ext cx="5485580" cy="707886"/>
           </a:xfrm>
           <a:prstGeom prst="rect">
             <a:avLst/>
@@ -4465,12 +4551,17 @@
             </a:r>
             <a:r>
               <a:rPr lang="en-US" sz="1000" dirty="0"/>
-              <a:t> checkout </a:t>
+              <a:t> </a:t>
             </a:r>
             <a:r>
               <a:rPr lang="en-US" sz="1000" dirty="0" smtClean="0"/>
-              <a:t>develop</a:t>
-            </a:r>
+              <a:t>checkout </a:t>
+            </a:r>
+            <a:r>
+              <a:rPr lang="en-US" sz="1000" dirty="0" err="1" smtClean="0"/>
+              <a:t>feature_branch</a:t>
+            </a:r>
+            <a:endParaRPr lang="en-US" sz="1000" dirty="0" smtClean="0"/>
           </a:p>
           <a:p>
             <a:r>
@@ -4487,50 +4578,52 @@
             </a:r>
             <a:r>
               <a:rPr lang="en-US" sz="1000" dirty="0"/>
-              <a:t>merge --no-</a:t>
-            </a:r>
-            <a:r>
-              <a:rPr lang="en-US" sz="1000" dirty="0" err="1"/>
+              <a:t>merge --</a:t>
+            </a:r>
+            <a:r>
+              <a:rPr lang="en-US" sz="1000" dirty="0" smtClean="0"/>
+              <a:t>no-</a:t>
+            </a:r>
+            <a:r>
+              <a:rPr lang="en-US" sz="1000" dirty="0" err="1" smtClean="0"/>
               <a:t>ff</a:t>
             </a:r>
             <a:r>
+              <a:rPr lang="en-US" sz="1000" dirty="0" smtClean="0"/>
+              <a:t> develop</a:t>
+            </a:r>
+          </a:p>
+          <a:p>
+            <a:r>
+              <a:rPr lang="en-US" sz="1000" dirty="0" smtClean="0"/>
+              <a:t># Fix merge conflict</a:t>
+            </a:r>
+            <a:endParaRPr lang="en-US" sz="1000" dirty="0" smtClean="0"/>
+          </a:p>
+          <a:p>
+            <a:r>
+              <a:rPr lang="en-US" sz="1000" dirty="0" smtClean="0"/>
+              <a:t>$  </a:t>
+            </a:r>
+            <a:r>
+              <a:rPr lang="en-US" sz="1000" dirty="0" err="1" smtClean="0"/>
+              <a:t>git</a:t>
+            </a:r>
+            <a:r>
+              <a:rPr lang="en-US" sz="1000" dirty="0" smtClean="0"/>
+              <a:t> </a:t>
+            </a:r>
+            <a:r>
               <a:rPr lang="en-US" sz="1000" dirty="0"/>
-              <a:t> </a:t>
-            </a:r>
-            <a:r>
-              <a:rPr lang="en-US" sz="1000" dirty="0" err="1" smtClean="0"/>
-              <a:t>suhendra</a:t>
+              <a:t>push </a:t>
             </a:r>
             <a:r>
               <a:rPr lang="en-US" sz="1000" dirty="0" smtClean="0"/>
-              <a:t>-ep-</a:t>
+              <a:t>origin </a:t>
             </a:r>
             <a:r>
               <a:rPr lang="en-US" sz="1000" dirty="0" err="1" smtClean="0"/>
               <a:t>feature_branch</a:t>
-            </a:r>
-            <a:endParaRPr lang="en-US" sz="1000" dirty="0" smtClean="0"/>
-          </a:p>
-          <a:p>
-            <a:r>
-              <a:rPr lang="en-US" sz="1000" dirty="0" smtClean="0"/>
-              <a:t>$  </a:t>
-            </a:r>
-            <a:r>
-              <a:rPr lang="en-US" sz="1000" dirty="0" err="1" smtClean="0"/>
-              <a:t>git</a:t>
-            </a:r>
-            <a:r>
-              <a:rPr lang="en-US" sz="1000" dirty="0" smtClean="0"/>
-              <a:t> </a:t>
-            </a:r>
-            <a:r>
-              <a:rPr lang="en-US" sz="1000" dirty="0"/>
-              <a:t>push origin </a:t>
-            </a:r>
-            <a:r>
-              <a:rPr lang="en-US" sz="1000" dirty="0" smtClean="0"/>
-              <a:t>develop</a:t>
             </a:r>
             <a:endParaRPr lang="en-US" sz="1000" dirty="0"/>
           </a:p>
@@ -4581,7 +4674,7 @@
         </p:nvSpPr>
         <p:spPr>
           <a:xfrm>
-            <a:off x="332656" y="195486"/>
+            <a:off x="260648" y="51470"/>
             <a:ext cx="6192688" cy="369332"/>
           </a:xfrm>
           <a:prstGeom prst="rect">
@@ -4602,7 +4695,7 @@
                 </a:solidFill>
                 <a:latin typeface="Bookman Old Style" panose="02050604050505020204" pitchFamily="18" charset="0"/>
               </a:rPr>
-              <a:t>CDC – git fork &amp; pull request </a:t>
+              <a:t>CDC – git fork &amp; pull </a:t>
             </a:r>
             <a:r>
               <a:rPr lang="en-ID" b="1" dirty="0" smtClean="0">
@@ -4611,7 +4704,7 @@
                 </a:solidFill>
                 <a:latin typeface="Bookman Old Style" panose="02050604050505020204" pitchFamily="18" charset="0"/>
               </a:rPr>
-              <a:t>/ Close pull request</a:t>
+              <a:t>request/Review and Close!</a:t>
             </a:r>
             <a:endParaRPr lang="en-US" b="1" dirty="0">
               <a:solidFill>
@@ -4624,14 +4717,14 @@
       </p:sp>
       <p:sp>
         <p:nvSpPr>
-          <p:cNvPr id="7" name="TextBox 6"/>
+          <p:cNvPr id="8" name="TextBox 7"/>
           <p:cNvSpPr txBox="1"/>
           <p:nvPr/>
         </p:nvSpPr>
         <p:spPr>
           <a:xfrm>
-            <a:off x="332656" y="555526"/>
-            <a:ext cx="4392488" cy="307777"/>
+            <a:off x="265956" y="411510"/>
+            <a:ext cx="3595092" cy="307777"/>
           </a:xfrm>
           <a:prstGeom prst="rect">
             <a:avLst/>
@@ -4644,52 +4737,35 @@
           </a:bodyPr>
           <a:lstStyle/>
           <a:p>
-            <a:pPr marL="285750" indent="-285750">
-              <a:buFont typeface="Wingdings" panose="05000000000000000000" pitchFamily="2" charset="2"/>
-              <a:buChar char="Ø"/>
-            </a:pPr>
+            <a:r>
+              <a:rPr lang="en-US" sz="1400" b="1" dirty="0" smtClean="0"/>
+              <a:t>Wait!!</a:t>
+            </a:r>
             <a:r>
               <a:rPr lang="en-US" sz="1400" dirty="0" smtClean="0"/>
-              <a:t>Project owner happy, merge pull request and close!</a:t>
-            </a:r>
-            <a:endParaRPr lang="en-US" sz="1400" dirty="0"/>
-          </a:p>
-        </p:txBody>
-      </p:sp>
-      <p:pic>
-        <p:nvPicPr>
-          <p:cNvPr id="3" name="Picture 2"/>
-          <p:cNvPicPr>
-            <a:picLocks noChangeAspect="1"/>
-          </p:cNvPicPr>
-          <p:nvPr/>
-        </p:nvPicPr>
-        <p:blipFill>
-          <a:blip r:embed="rId3"/>
-          <a:stretch>
-            <a:fillRect/>
-          </a:stretch>
-        </p:blipFill>
-        <p:spPr>
-          <a:xfrm>
-            <a:off x="663707" y="843558"/>
-            <a:ext cx="4249659" cy="1069667"/>
-          </a:xfrm>
-          <a:prstGeom prst="rect">
-            <a:avLst/>
-          </a:prstGeom>
-        </p:spPr>
-      </p:pic>
-      <p:sp>
-        <p:nvSpPr>
-          <p:cNvPr id="9" name="TextBox 8"/>
+              <a:t> </a:t>
+            </a:r>
+            <a:r>
+              <a:rPr lang="en-US" sz="1400" b="1" dirty="0" smtClean="0"/>
+              <a:t>Project owner found merge conflict</a:t>
+            </a:r>
+            <a:r>
+              <a:rPr lang="en-US" sz="1400" dirty="0" smtClean="0"/>
+              <a:t>.</a:t>
+            </a:r>
+          </a:p>
+        </p:txBody>
+      </p:sp>
+      <p:sp>
+        <p:nvSpPr>
+          <p:cNvPr id="16" name="TextBox 15"/>
           <p:cNvSpPr txBox="1"/>
           <p:nvPr/>
         </p:nvSpPr>
         <p:spPr>
           <a:xfrm>
-            <a:off x="332656" y="3507854"/>
-            <a:ext cx="4392488" cy="307777"/>
+            <a:off x="260648" y="679797"/>
+            <a:ext cx="5832648" cy="307777"/>
           </a:xfrm>
           <a:prstGeom prst="rect">
             <a:avLst/>
@@ -4704,19 +4780,23 @@
           <a:p>
             <a:pPr marL="285750" indent="-285750">
               <a:buFont typeface="Wingdings" panose="05000000000000000000" pitchFamily="2" charset="2"/>
-              <a:buChar char="Ø"/>
+              <a:buChar char="v"/>
             </a:pPr>
             <a:r>
+              <a:rPr lang="en-US" sz="1300" dirty="0" smtClean="0"/>
+              <a:t>OK. I will do it by myself. Here what I </a:t>
+            </a:r>
+            <a:r>
+              <a:rPr lang="en-US" sz="1300" dirty="0" err="1" smtClean="0"/>
+              <a:t>wanna</a:t>
+            </a:r>
+            <a:r>
+              <a:rPr lang="en-US" sz="1300" dirty="0" smtClean="0"/>
+              <a:t> do</a:t>
+            </a:r>
+            <a:r>
               <a:rPr lang="en-US" sz="1400" dirty="0" smtClean="0"/>
-              <a:t>Contributor </a:t>
-            </a:r>
-            <a:r>
-              <a:rPr lang="en-US" sz="1400" dirty="0"/>
-              <a:t>may sync  </a:t>
-            </a:r>
-            <a:r>
-              <a:rPr lang="en-US" sz="1400" dirty="0" smtClean="0"/>
-              <a:t>the forked repository</a:t>
+              <a:t>:</a:t>
             </a:r>
             <a:endParaRPr lang="en-US" sz="1400" dirty="0"/>
           </a:p>
@@ -4724,14 +4804,60 @@
       </p:sp>
       <p:sp>
         <p:nvSpPr>
-          <p:cNvPr id="10" name="TextBox 9"/>
+          <p:cNvPr id="17" name="TextBox 16"/>
           <p:cNvSpPr txBox="1"/>
           <p:nvPr/>
         </p:nvSpPr>
         <p:spPr>
           <a:xfrm>
-            <a:off x="476672" y="3867894"/>
-            <a:ext cx="5544616" cy="276999"/>
+            <a:off x="548680" y="941988"/>
+            <a:ext cx="5832648" cy="261610"/>
+          </a:xfrm>
+          <a:prstGeom prst="rect">
+            <a:avLst/>
+          </a:prstGeom>
+          <a:noFill/>
+        </p:spPr>
+        <p:txBody>
+          <a:bodyPr wrap="square" rtlCol="0">
+            <a:spAutoFit/>
+          </a:bodyPr>
+          <a:lstStyle/>
+          <a:p>
+            <a:r>
+              <a:rPr lang="en-US" sz="1100" b="1" dirty="0"/>
+              <a:t>Step 1:</a:t>
+            </a:r>
+            <a:r>
+              <a:rPr lang="en-US" sz="1100" dirty="0"/>
+              <a:t> From </a:t>
+            </a:r>
+            <a:r>
+              <a:rPr lang="en-US" sz="1100" dirty="0" smtClean="0"/>
+              <a:t>my project </a:t>
+            </a:r>
+            <a:r>
+              <a:rPr lang="en-US" sz="1100" dirty="0"/>
+              <a:t>repository, check out a new branch and test the changes</a:t>
+            </a:r>
+            <a:r>
+              <a:rPr lang="en-US" sz="1100" dirty="0" smtClean="0"/>
+              <a:t>.</a:t>
+            </a:r>
+            <a:endParaRPr lang="en-US" sz="1100" dirty="0"/>
+          </a:p>
+        </p:txBody>
+      </p:sp>
+      <p:sp>
+        <p:nvSpPr>
+          <p:cNvPr id="19" name="TextBox 18"/>
+          <p:cNvSpPr txBox="1"/>
+          <p:nvPr/>
+        </p:nvSpPr>
+        <p:spPr>
+          <a:xfrm>
+            <a:off x="620688" y="1275606"/>
+            <a:ext cx="5485581" cy="400110"/>
           </a:xfrm>
           <a:prstGeom prst="rect">
             <a:avLst/>
@@ -4758,38 +4884,281 @@
           <a:lstStyle/>
           <a:p>
             <a:r>
-              <a:rPr lang="en-US" sz="1200" dirty="0"/>
+              <a:rPr lang="en-US" sz="1000" dirty="0"/>
               <a:t>$ </a:t>
             </a:r>
             <a:r>
-              <a:rPr lang="en-US" sz="1200" dirty="0" err="1"/>
+              <a:rPr lang="en-US" sz="1000" dirty="0" err="1" smtClean="0"/>
               <a:t>git</a:t>
             </a:r>
             <a:r>
-              <a:rPr lang="en-US" sz="1200" dirty="0"/>
-              <a:t> pull upstream develop</a:t>
-            </a:r>
+              <a:rPr lang="en-US" sz="1000" dirty="0" smtClean="0"/>
+              <a:t> </a:t>
+            </a:r>
+            <a:r>
+              <a:rPr lang="en-US" sz="1000" dirty="0"/>
+              <a:t>checkout -b </a:t>
+            </a:r>
+            <a:r>
+              <a:rPr lang="en-US" sz="1000" dirty="0" err="1"/>
+              <a:t>suhendra</a:t>
+            </a:r>
+            <a:r>
+              <a:rPr lang="en-US" sz="1000" dirty="0"/>
+              <a:t>-ep-</a:t>
+            </a:r>
+            <a:r>
+              <a:rPr lang="en-US" sz="1000" dirty="0" err="1"/>
+              <a:t>feature_branch</a:t>
+            </a:r>
+            <a:r>
+              <a:rPr lang="en-US" sz="1000" dirty="0"/>
+              <a:t> develop </a:t>
+            </a:r>
+            <a:endParaRPr lang="en-US" sz="1000" dirty="0" smtClean="0"/>
+          </a:p>
+          <a:p>
+            <a:r>
+              <a:rPr lang="en-US" sz="1000" dirty="0" smtClean="0"/>
+              <a:t>$ </a:t>
+            </a:r>
+            <a:r>
+              <a:rPr lang="en-US" sz="1000" dirty="0" err="1" smtClean="0"/>
+              <a:t>git</a:t>
+            </a:r>
+            <a:r>
+              <a:rPr lang="en-US" sz="1000" dirty="0" smtClean="0"/>
+              <a:t> </a:t>
+            </a:r>
+            <a:r>
+              <a:rPr lang="en-US" sz="1000" dirty="0"/>
+              <a:t>pull https://github.com/suhendra-ep/ws3.git </a:t>
+            </a:r>
+            <a:r>
+              <a:rPr lang="en-US" sz="1000" dirty="0" err="1"/>
+              <a:t>feature_branch</a:t>
+            </a:r>
+            <a:r>
+              <a:rPr lang="en-US" sz="1000" dirty="0"/>
+              <a:t> </a:t>
+            </a:r>
+          </a:p>
+        </p:txBody>
+      </p:sp>
+      <p:sp>
+        <p:nvSpPr>
+          <p:cNvPr id="20" name="TextBox 19"/>
+          <p:cNvSpPr txBox="1"/>
+          <p:nvPr/>
+        </p:nvSpPr>
+        <p:spPr>
+          <a:xfrm>
+            <a:off x="548680" y="1779662"/>
+            <a:ext cx="5832648" cy="261610"/>
+          </a:xfrm>
+          <a:prstGeom prst="rect">
+            <a:avLst/>
+          </a:prstGeom>
+          <a:noFill/>
+        </p:spPr>
+        <p:txBody>
+          <a:bodyPr wrap="square" rtlCol="0">
+            <a:spAutoFit/>
+          </a:bodyPr>
+          <a:lstStyle/>
+          <a:p>
+            <a:r>
+              <a:rPr lang="en-US" sz="1100" b="1" dirty="0" smtClean="0"/>
+              <a:t>Step </a:t>
+            </a:r>
+            <a:r>
+              <a:rPr lang="en-US" sz="1100" b="1" dirty="0"/>
+              <a:t>2:</a:t>
+            </a:r>
+            <a:r>
+              <a:rPr lang="en-US" sz="1100" dirty="0"/>
+              <a:t> Merge the changes and update on GitHub</a:t>
+            </a:r>
+            <a:r>
+              <a:rPr lang="en-US" sz="1100" dirty="0" smtClean="0"/>
+              <a:t>.</a:t>
+            </a:r>
+            <a:endParaRPr lang="en-US" sz="1100" dirty="0"/>
+          </a:p>
+        </p:txBody>
+      </p:sp>
+      <p:sp>
+        <p:nvSpPr>
+          <p:cNvPr id="21" name="TextBox 20"/>
+          <p:cNvSpPr txBox="1"/>
+          <p:nvPr/>
+        </p:nvSpPr>
+        <p:spPr>
+          <a:xfrm>
+            <a:off x="620688" y="2067694"/>
+            <a:ext cx="5485580" cy="553998"/>
+          </a:xfrm>
+          <a:prstGeom prst="rect">
+            <a:avLst/>
+          </a:prstGeom>
+        </p:spPr>
+        <p:style>
+          <a:lnRef idx="0">
+            <a:schemeClr val="dk1"/>
+          </a:lnRef>
+          <a:fillRef idx="3">
+            <a:schemeClr val="dk1"/>
+          </a:fillRef>
+          <a:effectRef idx="3">
+            <a:schemeClr val="dk1"/>
+          </a:effectRef>
+          <a:fontRef idx="minor">
+            <a:schemeClr val="lt1"/>
+          </a:fontRef>
+        </p:style>
+        <p:txBody>
+          <a:bodyPr wrap="square" rtlCol="0">
+            <a:spAutoFit/>
+          </a:bodyPr>
+          <a:lstStyle/>
+          <a:p>
+            <a:r>
+              <a:rPr lang="en-US" sz="1000" dirty="0"/>
+              <a:t>$ </a:t>
+            </a:r>
+            <a:r>
+              <a:rPr lang="en-US" sz="1000" dirty="0" smtClean="0"/>
+              <a:t> </a:t>
+            </a:r>
+            <a:r>
+              <a:rPr lang="en-US" sz="1000" dirty="0" err="1"/>
+              <a:t>git</a:t>
+            </a:r>
+            <a:r>
+              <a:rPr lang="en-US" sz="1000" dirty="0"/>
+              <a:t> checkout </a:t>
+            </a:r>
+            <a:r>
+              <a:rPr lang="en-US" sz="1000" dirty="0" smtClean="0"/>
+              <a:t>develop</a:t>
+            </a:r>
+          </a:p>
+          <a:p>
+            <a:r>
+              <a:rPr lang="en-US" sz="1000" dirty="0" smtClean="0"/>
+              <a:t>$  </a:t>
+            </a:r>
+            <a:r>
+              <a:rPr lang="en-US" sz="1000" dirty="0" err="1" smtClean="0"/>
+              <a:t>git</a:t>
+            </a:r>
+            <a:r>
+              <a:rPr lang="en-US" sz="1000" dirty="0" smtClean="0"/>
+              <a:t> </a:t>
+            </a:r>
+            <a:r>
+              <a:rPr lang="en-US" sz="1000" dirty="0"/>
+              <a:t>merge --no-</a:t>
+            </a:r>
+            <a:r>
+              <a:rPr lang="en-US" sz="1000" dirty="0" err="1"/>
+              <a:t>ff</a:t>
+            </a:r>
+            <a:r>
+              <a:rPr lang="en-US" sz="1000" dirty="0"/>
+              <a:t> </a:t>
+            </a:r>
+            <a:r>
+              <a:rPr lang="en-US" sz="1000" dirty="0" err="1" smtClean="0"/>
+              <a:t>suhendra</a:t>
+            </a:r>
+            <a:r>
+              <a:rPr lang="en-US" sz="1000" dirty="0" smtClean="0"/>
+              <a:t>-ep-</a:t>
+            </a:r>
+            <a:r>
+              <a:rPr lang="en-US" sz="1000" dirty="0" err="1" smtClean="0"/>
+              <a:t>feature_branch</a:t>
+            </a:r>
+            <a:endParaRPr lang="en-US" sz="1000" dirty="0" smtClean="0"/>
+          </a:p>
+          <a:p>
+            <a:r>
+              <a:rPr lang="en-US" sz="1000" dirty="0" smtClean="0"/>
+              <a:t>$  </a:t>
+            </a:r>
+            <a:r>
+              <a:rPr lang="en-US" sz="1000" dirty="0" err="1" smtClean="0"/>
+              <a:t>git</a:t>
+            </a:r>
+            <a:r>
+              <a:rPr lang="en-US" sz="1000" dirty="0" smtClean="0"/>
+              <a:t> </a:t>
+            </a:r>
+            <a:r>
+              <a:rPr lang="en-US" sz="1000" dirty="0"/>
+              <a:t>push origin </a:t>
+            </a:r>
+            <a:r>
+              <a:rPr lang="en-US" sz="1000" dirty="0" smtClean="0"/>
+              <a:t>develop</a:t>
+            </a:r>
+            <a:endParaRPr lang="en-US" sz="1000" dirty="0"/>
+          </a:p>
+        </p:txBody>
+      </p:sp>
+      <p:sp>
+        <p:nvSpPr>
+          <p:cNvPr id="12" name="TextBox 11"/>
+          <p:cNvSpPr txBox="1"/>
+          <p:nvPr/>
+        </p:nvSpPr>
+        <p:spPr>
+          <a:xfrm>
+            <a:off x="265956" y="2912045"/>
+            <a:ext cx="5755332" cy="307777"/>
+          </a:xfrm>
+          <a:prstGeom prst="rect">
+            <a:avLst/>
+          </a:prstGeom>
+          <a:noFill/>
+        </p:spPr>
+        <p:txBody>
+          <a:bodyPr wrap="square" rtlCol="0">
+            <a:spAutoFit/>
+          </a:bodyPr>
+          <a:lstStyle/>
+          <a:p>
+            <a:r>
+              <a:rPr lang="en-US" sz="1400" b="1" dirty="0"/>
+              <a:t>T</a:t>
+            </a:r>
+            <a:r>
+              <a:rPr lang="en-US" sz="1400" b="1" dirty="0" smtClean="0"/>
+              <a:t>hat’s it! I’m happy with your work, I’ll merge your pull request!</a:t>
+            </a:r>
+            <a:endParaRPr lang="en-US" sz="1400" b="1" dirty="0" smtClean="0"/>
           </a:p>
         </p:txBody>
       </p:sp>
       <p:pic>
         <p:nvPicPr>
-          <p:cNvPr id="8" name="Picture 7"/>
+          <p:cNvPr id="14" name="Picture 13"/>
           <p:cNvPicPr>
             <a:picLocks noChangeAspect="1"/>
           </p:cNvPicPr>
           <p:nvPr/>
         </p:nvPicPr>
         <p:blipFill>
-          <a:blip r:embed="rId4"/>
+          <a:blip r:embed="rId3"/>
           <a:stretch>
             <a:fillRect/>
           </a:stretch>
         </p:blipFill>
         <p:spPr>
           <a:xfrm>
-            <a:off x="691509" y="1995686"/>
-            <a:ext cx="4249659" cy="1325203"/>
+            <a:off x="265609" y="3260472"/>
+            <a:ext cx="4249659" cy="1069667"/>
           </a:xfrm>
           <a:prstGeom prst="rect">
             <a:avLst/>
@@ -4799,7 +5168,7 @@
     </p:spTree>
     <p:extLst>
       <p:ext uri="{BB962C8B-B14F-4D97-AF65-F5344CB8AC3E}">
-        <p14:creationId xmlns:p14="http://schemas.microsoft.com/office/powerpoint/2010/main" val="3899566160"/>
+        <p14:creationId xmlns:p14="http://schemas.microsoft.com/office/powerpoint/2010/main" val="1895992923"/>
       </p:ext>
     </p:extLst>
   </p:cSld>
@@ -7549,15 +7918,7 @@
             </a:pPr>
             <a:r>
               <a:rPr lang="en-US" sz="1400" dirty="0" smtClean="0"/>
-              <a:t>Project owner </a:t>
-            </a:r>
-            <a:r>
-              <a:rPr lang="en-US" sz="1400" dirty="0" smtClean="0"/>
-              <a:t>have a look on the </a:t>
-            </a:r>
-            <a:r>
-              <a:rPr lang="en-US" sz="1400" dirty="0" smtClean="0"/>
-              <a:t>pull request</a:t>
+              <a:t>Project owner have a look on the pull request</a:t>
             </a:r>
             <a:endParaRPr lang="en-US" sz="1400" dirty="0"/>
           </a:p>
@@ -7639,15 +8000,7 @@
             </a:pPr>
             <a:r>
               <a:rPr lang="en-US" sz="1400" dirty="0" smtClean="0"/>
-              <a:t>Project </a:t>
-            </a:r>
-            <a:r>
-              <a:rPr lang="en-US" sz="1400" dirty="0" smtClean="0"/>
-              <a:t>owner </a:t>
-            </a:r>
-            <a:r>
-              <a:rPr lang="en-US" sz="1400" dirty="0" smtClean="0"/>
-              <a:t>review the changes. </a:t>
+              <a:t>Project owner review the changes. </a:t>
             </a:r>
             <a:br>
               <a:rPr lang="en-US" sz="1400" dirty="0" smtClean="0"/>
@@ -8361,18 +8714,18 @@
 </file>
 
 <file path=customXml/item2.xml><?xml version="1.0" encoding="utf-8"?>
-<p:properties xmlns:p="http://schemas.microsoft.com/office/2006/metadata/properties" xmlns:xsi="http://www.w3.org/2001/XMLSchema-instance" xmlns:pc="http://schemas.microsoft.com/office/infopath/2007/PartnerControls">
-  <documentManagement/>
-</p:properties>
-</file>
-
-<file path=customXml/item3.xml><?xml version="1.0" encoding="utf-8"?>
 <?mso-contentType ?>
 <FormTemplates xmlns="http://schemas.microsoft.com/sharepoint/v3/contenttype/forms">
   <Display>DocumentLibraryForm</Display>
   <Edit>DocumentLibraryForm</Edit>
   <New>DocumentLibraryForm</New>
 </FormTemplates>
+</file>
+
+<file path=customXml/item3.xml><?xml version="1.0" encoding="utf-8"?>
+<p:properties xmlns:p="http://schemas.microsoft.com/office/2006/metadata/properties" xmlns:xsi="http://www.w3.org/2001/XMLSchema-instance" xmlns:pc="http://schemas.microsoft.com/office/infopath/2007/PartnerControls">
+  <documentManagement/>
+</p:properties>
 </file>
 
 <file path=customXml/itemProps1.xml><?xml version="1.0" encoding="utf-8"?>
@@ -8392,6 +8745,14 @@
 </file>
 
 <file path=customXml/itemProps2.xml><?xml version="1.0" encoding="utf-8"?>
+<ds:datastoreItem xmlns:ds="http://schemas.openxmlformats.org/officeDocument/2006/customXml" ds:itemID="{DB5E681D-860B-4D22-80CF-C7472F8C312F}">
+  <ds:schemaRefs>
+    <ds:schemaRef ds:uri="http://schemas.microsoft.com/sharepoint/v3/contenttype/forms"/>
+  </ds:schemaRefs>
+</ds:datastoreItem>
+</file>
+
+<file path=customXml/itemProps3.xml><?xml version="1.0" encoding="utf-8"?>
 <ds:datastoreItem xmlns:ds="http://schemas.openxmlformats.org/officeDocument/2006/customXml" ds:itemID="{12B43294-76B4-4246-849F-628E6870A5FD}">
   <ds:schemaRefs>
     <ds:schemaRef ds:uri="http://schemas.microsoft.com/office/2006/documentManagement/types"/>
@@ -8404,12 +8765,4 @@
     <ds:schemaRef ds:uri="http://www.w3.org/XML/1998/namespace"/>
   </ds:schemaRefs>
 </ds:datastoreItem>
-</file>
-
-<file path=customXml/itemProps3.xml><?xml version="1.0" encoding="utf-8"?>
-<ds:datastoreItem xmlns:ds="http://schemas.openxmlformats.org/officeDocument/2006/customXml" ds:itemID="{DB5E681D-860B-4D22-80CF-C7472F8C312F}">
-  <ds:schemaRefs>
-    <ds:schemaRef ds:uri="http://schemas.microsoft.com/sharepoint/v3/contenttype/forms"/>
-  </ds:schemaRefs>
-</ds:datastoreItem>
 </file>
</xml_diff>